<commit_message>
change IDE for python
</commit_message>
<xml_diff>
--- a/Courses/Computer-Modeling-and-IT/Computer-Modeling-and-IT-6-Class/27-{last-number}-Python/27-Introduction-to-Python/27-Introduction-to-Python.pptx
+++ b/Courses/Computer-Modeling-and-IT/Computer-Modeling-and-IT-6-Class/27-{last-number}-Python/27-Introduction-to-Python/27-Introduction-to-Python.pptx
@@ -5,10 +5,10 @@
     <p:sldMasterId id="2147483675" r:id="rId1"/>
   </p:sldMasterIdLst>
   <p:notesMasterIdLst>
-    <p:notesMasterId r:id="rId33"/>
+    <p:notesMasterId r:id="rId34"/>
   </p:notesMasterIdLst>
   <p:handoutMasterIdLst>
-    <p:handoutMasterId r:id="rId34"/>
+    <p:handoutMasterId r:id="rId35"/>
   </p:handoutMasterIdLst>
   <p:sldIdLst>
     <p:sldId id="503" r:id="rId2"/>
@@ -18,30 +18,31 @@
     <p:sldId id="587" r:id="rId6"/>
     <p:sldId id="590" r:id="rId7"/>
     <p:sldId id="592" r:id="rId8"/>
-    <p:sldId id="591" r:id="rId9"/>
-    <p:sldId id="595" r:id="rId10"/>
-    <p:sldId id="593" r:id="rId11"/>
-    <p:sldId id="594" r:id="rId12"/>
-    <p:sldId id="596" r:id="rId13"/>
-    <p:sldId id="597" r:id="rId14"/>
-    <p:sldId id="598" r:id="rId15"/>
-    <p:sldId id="599" r:id="rId16"/>
-    <p:sldId id="600" r:id="rId17"/>
-    <p:sldId id="601" r:id="rId18"/>
-    <p:sldId id="603" r:id="rId19"/>
-    <p:sldId id="604" r:id="rId20"/>
-    <p:sldId id="605" r:id="rId21"/>
-    <p:sldId id="606" r:id="rId22"/>
-    <p:sldId id="607" r:id="rId23"/>
-    <p:sldId id="608" r:id="rId24"/>
-    <p:sldId id="609" r:id="rId25"/>
-    <p:sldId id="610" r:id="rId26"/>
-    <p:sldId id="611" r:id="rId27"/>
-    <p:sldId id="612" r:id="rId28"/>
-    <p:sldId id="613" r:id="rId29"/>
-    <p:sldId id="586" r:id="rId30"/>
-    <p:sldId id="504" r:id="rId31"/>
-    <p:sldId id="505" r:id="rId32"/>
+    <p:sldId id="614" r:id="rId9"/>
+    <p:sldId id="591" r:id="rId10"/>
+    <p:sldId id="595" r:id="rId11"/>
+    <p:sldId id="593" r:id="rId12"/>
+    <p:sldId id="594" r:id="rId13"/>
+    <p:sldId id="596" r:id="rId14"/>
+    <p:sldId id="597" r:id="rId15"/>
+    <p:sldId id="598" r:id="rId16"/>
+    <p:sldId id="599" r:id="rId17"/>
+    <p:sldId id="600" r:id="rId18"/>
+    <p:sldId id="601" r:id="rId19"/>
+    <p:sldId id="603" r:id="rId20"/>
+    <p:sldId id="604" r:id="rId21"/>
+    <p:sldId id="605" r:id="rId22"/>
+    <p:sldId id="606" r:id="rId23"/>
+    <p:sldId id="607" r:id="rId24"/>
+    <p:sldId id="608" r:id="rId25"/>
+    <p:sldId id="609" r:id="rId26"/>
+    <p:sldId id="610" r:id="rId27"/>
+    <p:sldId id="611" r:id="rId28"/>
+    <p:sldId id="612" r:id="rId29"/>
+    <p:sldId id="613" r:id="rId30"/>
+    <p:sldId id="586" r:id="rId31"/>
+    <p:sldId id="504" r:id="rId32"/>
+    <p:sldId id="505" r:id="rId33"/>
   </p:sldIdLst>
   <p:sldSz cx="12192000" cy="6858000"/>
   <p:notesSz cx="6858000" cy="9144000"/>
@@ -160,6 +161,7 @@
             <p14:sldId id="587"/>
             <p14:sldId id="590"/>
             <p14:sldId id="592"/>
+            <p14:sldId id="614"/>
             <p14:sldId id="591"/>
             <p14:sldId id="595"/>
             <p14:sldId id="593"/>
@@ -323,7 +325,7 @@
           <a:p>
             <a:fld id="{4E087215-0C8F-4762-A664-737A353EC9A4}" type="datetimeFigureOut">
               <a:rPr lang="bg-BG" smtClean="0"/>
-              <a:t>27.10.2024 г.</a:t>
+              <a:t>19.11.2024 г.</a:t>
             </a:fld>
             <a:endParaRPr lang="bg-BG"/>
           </a:p>
@@ -519,7 +521,7 @@
           <a:p>
             <a:fld id="{72D84649-876A-46C9-8472-14CB09C070D8}" type="datetimeFigureOut">
               <a:rPr lang="en-US" smtClean="0"/>
-              <a:t>10/27/2024</a:t>
+              <a:t>11/19/2024</a:t>
             </a:fld>
             <a:endParaRPr lang="en-US"/>
           </a:p>
@@ -1304,7 +1306,7 @@
             <a:fld id="{3EBA5BD7-F043-4D1B-AA17-CD412FC534DE}" type="slidenum">
               <a:rPr lang="en-US" smtClean="0"/>
               <a:pPr/>
-              <a:t>29</a:t>
+              <a:t>30</a:t>
             </a:fld>
             <a:endParaRPr lang="en-US" dirty="0"/>
           </a:p>
@@ -1495,7 +1497,7 @@
             <a:fld id="{3EBA5BD7-F043-4D1B-AA17-CD412FC534DE}" type="slidenum">
               <a:rPr lang="en-US" smtClean="0"/>
               <a:pPr/>
-              <a:t>30</a:t>
+              <a:t>31</a:t>
             </a:fld>
             <a:endParaRPr lang="en-US" dirty="0"/>
           </a:p>
@@ -1725,7 +1727,7 @@
             <a:fld id="{3EBA5BD7-F043-4D1B-AA17-CD412FC534DE}" type="slidenum">
               <a:rPr lang="en-US" smtClean="0"/>
               <a:pPr/>
-              <a:t>31</a:t>
+              <a:t>32</a:t>
             </a:fld>
             <a:endParaRPr lang="en-US" dirty="0"/>
           </a:p>
@@ -7142,6 +7144,47 @@
           <a:chExt cx="0" cy="0"/>
         </a:xfrm>
       </p:grpSpPr>
+      <p:pic>
+        <p:nvPicPr>
+          <p:cNvPr id="1026" name="Picture 2" descr="What is F5 - javatpoint"/>
+          <p:cNvPicPr>
+            <a:picLocks noChangeAspect="1" noChangeArrowheads="1"/>
+          </p:cNvPicPr>
+          <p:nvPr/>
+        </p:nvPicPr>
+        <p:blipFill>
+          <a:blip r:embed="rId2">
+            <a:extLst>
+              <a:ext uri="{28A0092B-C50C-407E-A947-70E740481C1C}">
+                <a14:useLocalDpi xmlns:a14="http://schemas.microsoft.com/office/drawing/2010/main" val="0"/>
+              </a:ext>
+            </a:extLst>
+          </a:blip>
+          <a:srcRect/>
+          <a:stretch>
+            <a:fillRect/>
+          </a:stretch>
+        </p:blipFill>
+        <p:spPr bwMode="auto">
+          <a:xfrm>
+            <a:off x="7041000" y="3699000"/>
+            <a:ext cx="2341252" cy="2216385"/>
+          </a:xfrm>
+          <a:prstGeom prst="rect">
+            <a:avLst/>
+          </a:prstGeom>
+          <a:noFill/>
+          <a:extLst>
+            <a:ext uri="{909E8E84-426E-40DD-AFC4-6F175D3DCCD1}">
+              <a14:hiddenFill xmlns:a14="http://schemas.microsoft.com/office/drawing/2010/main">
+                <a:solidFill>
+                  <a:srgbClr val="FFFFFF"/>
+                </a:solidFill>
+              </a14:hiddenFill>
+            </a:ext>
+          </a:extLst>
+        </p:spPr>
+      </p:pic>
       <p:sp>
         <p:nvSpPr>
           <p:cNvPr id="2" name="Slide Number Placeholder 1"/>
@@ -7191,19 +7234,27 @@
             </a:pPr>
             <a:r>
               <a:rPr lang="bg-BG" sz="3600" dirty="0"/>
-              <a:t>Ако </a:t>
+              <a:t>Има два начина за </a:t>
             </a:r>
             <a:r>
               <a:rPr lang="bg-BG" sz="3600" b="1" dirty="0"/>
-              <a:t>няма грешки</a:t>
+              <a:t>стартиране</a:t>
             </a:r>
             <a:r>
               <a:rPr lang="bg-BG" sz="3600" dirty="0"/>
-              <a:t>, програмата ще се изпълни</a:t>
-            </a:r>
-          </a:p>
-          <a:p>
-            <a:pPr>
+              <a:t> на </a:t>
+            </a:r>
+            <a:r>
+              <a:rPr lang="bg-BG" sz="3600" b="1" dirty="0"/>
+              <a:t>програмата</a:t>
+            </a:r>
+            <a:r>
+              <a:rPr lang="bg-BG" sz="3600" dirty="0" smtClean="0"/>
+              <a:t>:</a:t>
+            </a:r>
+          </a:p>
+          <a:p>
+            <a:pPr lvl="1">
               <a:spcBef>
                 <a:spcPts val="0"/>
               </a:spcBef>
@@ -7212,18 +7263,92 @@
               </a:spcAft>
             </a:pPr>
             <a:r>
-              <a:rPr lang="bg-BG" sz="3600" dirty="0"/>
-              <a:t>Резултатът ще се изпише на </a:t>
-            </a:r>
-            <a:r>
-              <a:rPr lang="bg-BG" sz="3600" b="1" dirty="0" smtClean="0"/>
-              <a:t>конзолата</a:t>
-            </a:r>
-            <a:r>
-              <a:rPr lang="bg-BG" sz="3600" dirty="0" smtClean="0"/>
-              <a:t>:</a:t>
-            </a:r>
-            <a:endParaRPr lang="en-US" sz="3600" dirty="0"/>
+              <a:rPr lang="bg-BG" sz="3400" dirty="0"/>
+              <a:t>Чрез </a:t>
+            </a:r>
+            <a:r>
+              <a:rPr lang="bg-BG" sz="3400" dirty="0" smtClean="0"/>
+              <a:t>натис</a:t>
+            </a:r>
+            <a:r>
+              <a:rPr lang="bg-BG" sz="3400" dirty="0" smtClean="0"/>
+              <a:t>кане</a:t>
+            </a:r>
+            <a:r>
+              <a:rPr lang="en-US" sz="3400" dirty="0" smtClean="0"/>
+              <a:t> </a:t>
+            </a:r>
+            <a:r>
+              <a:rPr lang="bg-BG" sz="3400" dirty="0"/>
+              <a:t>на </a:t>
+            </a:r>
+            <a:r>
+              <a:rPr lang="bg-BG" sz="3400" b="1" dirty="0"/>
+              <a:t>бутона</a:t>
+            </a:r>
+            <a:r>
+              <a:rPr lang="bg-BG" sz="3400" dirty="0"/>
+              <a:t> [</a:t>
+            </a:r>
+            <a:r>
+              <a:rPr lang="en-US" sz="3400" b="1" dirty="0">
+                <a:solidFill>
+                  <a:schemeClr val="bg1"/>
+                </a:solidFill>
+              </a:rPr>
+              <a:t>Run</a:t>
+            </a:r>
+            <a:r>
+              <a:rPr lang="en-US" sz="3400" dirty="0" smtClean="0"/>
+              <a:t>]</a:t>
+            </a:r>
+            <a:endParaRPr lang="bg-BG" sz="3600" dirty="0"/>
+          </a:p>
+          <a:p>
+            <a:pPr lvl="1">
+              <a:spcBef>
+                <a:spcPts val="0"/>
+              </a:spcBef>
+              <a:spcAft>
+                <a:spcPts val="0"/>
+              </a:spcAft>
+            </a:pPr>
+            <a:r>
+              <a:rPr lang="bg-BG" sz="3400" dirty="0"/>
+              <a:t>Чрез </a:t>
+            </a:r>
+            <a:r>
+              <a:rPr lang="bg-BG" sz="3400" b="1" dirty="0" smtClean="0"/>
+              <a:t>клашива</a:t>
+            </a:r>
+            <a:r>
+              <a:rPr lang="bg-BG" sz="3400" dirty="0" smtClean="0"/>
+              <a:t> </a:t>
+            </a:r>
+            <a:r>
+              <a:rPr lang="en-US" sz="3400" dirty="0" smtClean="0"/>
+              <a:t>[</a:t>
+            </a:r>
+            <a:r>
+              <a:rPr lang="en-US" sz="3400" b="1" dirty="0" smtClean="0">
+                <a:solidFill>
+                  <a:schemeClr val="bg1"/>
+                </a:solidFill>
+              </a:rPr>
+              <a:t>F5</a:t>
+            </a:r>
+            <a:r>
+              <a:rPr lang="en-US" sz="3400" dirty="0" smtClean="0"/>
+              <a:t>]</a:t>
+            </a:r>
+            <a:endParaRPr lang="bg-BG" sz="3400" b="1" dirty="0">
+              <a:solidFill>
+                <a:schemeClr val="bg1"/>
+              </a:solidFill>
+            </a:endParaRPr>
+          </a:p>
+          <a:p>
+            <a:endParaRPr lang="en-US" dirty="0"/>
           </a:p>
         </p:txBody>
       </p:sp>
@@ -7243,8 +7368,8 @@
           <a:lstStyle/>
           <a:p>
             <a:r>
-              <a:rPr lang="bg-BG" dirty="0"/>
-              <a:t>Резултат от стартиране на програмата</a:t>
+              <a:rPr lang="bg-BG" dirty="0" smtClean="0"/>
+              <a:t>Стартиране на програмата</a:t>
             </a:r>
             <a:endParaRPr lang="en-US" dirty="0"/>
           </a:p>
@@ -7252,7 +7377,257 @@
       </p:sp>
       <p:pic>
         <p:nvPicPr>
-          <p:cNvPr id="5" name="Picture 4"/>
+          <p:cNvPr id="6" name="Picture 5"/>
+          <p:cNvPicPr>
+            <a:picLocks noChangeAspect="1"/>
+          </p:cNvPicPr>
+          <p:nvPr/>
+        </p:nvPicPr>
+        <p:blipFill rotWithShape="1">
+          <a:blip r:embed="rId3"/>
+          <a:srcRect t="3273"/>
+          <a:stretch/>
+        </p:blipFill>
+        <p:spPr>
+          <a:xfrm>
+            <a:off x="1866000" y="4142227"/>
+            <a:ext cx="3928375" cy="1329930"/>
+          </a:xfrm>
+          <a:prstGeom prst="rect">
+            <a:avLst/>
+          </a:prstGeom>
+          <a:ln>
+            <a:solidFill>
+              <a:schemeClr val="bg2">
+                <a:lumMod val="75000"/>
+              </a:schemeClr>
+            </a:solidFill>
+          </a:ln>
+        </p:spPr>
+      </p:pic>
+    </p:spTree>
+    <p:extLst>
+      <p:ext uri="{BB962C8B-B14F-4D97-AF65-F5344CB8AC3E}">
+        <p14:creationId xmlns:p14="http://schemas.microsoft.com/office/powerpoint/2010/main" val="805259703"/>
+      </p:ext>
+    </p:extLst>
+  </p:cSld>
+  <p:clrMapOvr>
+    <a:masterClrMapping/>
+  </p:clrMapOvr>
+  <mc:AlternateContent xmlns:mc="http://schemas.openxmlformats.org/markup-compatibility/2006" xmlns:p14="http://schemas.microsoft.com/office/powerpoint/2010/main">
+    <mc:Choice Requires="p14">
+      <p:transition spd="slow" p14:dur="2000" advClick="0" advTm="5000"/>
+    </mc:Choice>
+    <mc:Fallback xmlns="">
+      <p:transition spd="slow" advClick="0" advTm="5000"/>
+    </mc:Fallback>
+  </mc:AlternateContent>
+  <p:timing>
+    <p:tnLst>
+      <p:par>
+        <p:cTn id="1" dur="indefinite" restart="never" nodeType="tmRoot">
+          <p:childTnLst>
+            <p:seq concurrent="1" nextAc="seek">
+              <p:cTn id="2" dur="indefinite" nodeType="mainSeq">
+                <p:childTnLst>
+                  <p:par>
+                    <p:cTn id="3" fill="hold">
+                      <p:stCondLst>
+                        <p:cond delay="indefinite"/>
+                      </p:stCondLst>
+                      <p:childTnLst>
+                        <p:par>
+                          <p:cTn id="4" fill="hold">
+                            <p:stCondLst>
+                              <p:cond delay="0"/>
+                            </p:stCondLst>
+                            <p:childTnLst>
+                              <p:par>
+                                <p:cTn id="5" presetID="1" presetClass="entr" presetSubtype="0" fill="hold" nodeType="clickEffect">
+                                  <p:stCondLst>
+                                    <p:cond delay="0"/>
+                                  </p:stCondLst>
+                                  <p:childTnLst>
+                                    <p:set>
+                                      <p:cBhvr>
+                                        <p:cTn id="6" dur="1" fill="hold">
+                                          <p:stCondLst>
+                                            <p:cond delay="0"/>
+                                          </p:stCondLst>
+                                        </p:cTn>
+                                        <p:tgtEl>
+                                          <p:spTgt spid="3">
+                                            <p:txEl>
+                                              <p:pRg st="1" end="1"/>
+                                            </p:txEl>
+                                          </p:spTgt>
+                                        </p:tgtEl>
+                                        <p:attrNameLst>
+                                          <p:attrName>style.visibility</p:attrName>
+                                        </p:attrNameLst>
+                                      </p:cBhvr>
+                                      <p:to>
+                                        <p:strVal val="visible"/>
+                                      </p:to>
+                                    </p:set>
+                                  </p:childTnLst>
+                                </p:cTn>
+                              </p:par>
+                              <p:par>
+                                <p:cTn id="7" presetID="1" presetClass="entr" presetSubtype="0" fill="hold" nodeType="withEffect">
+                                  <p:stCondLst>
+                                    <p:cond delay="0"/>
+                                  </p:stCondLst>
+                                  <p:childTnLst>
+                                    <p:set>
+                                      <p:cBhvr>
+                                        <p:cTn id="8" dur="1" fill="hold">
+                                          <p:stCondLst>
+                                            <p:cond delay="0"/>
+                                          </p:stCondLst>
+                                        </p:cTn>
+                                        <p:tgtEl>
+                                          <p:spTgt spid="6"/>
+                                        </p:tgtEl>
+                                        <p:attrNameLst>
+                                          <p:attrName>style.visibility</p:attrName>
+                                        </p:attrNameLst>
+                                      </p:cBhvr>
+                                      <p:to>
+                                        <p:strVal val="visible"/>
+                                      </p:to>
+                                    </p:set>
+                                  </p:childTnLst>
+                                </p:cTn>
+                              </p:par>
+                            </p:childTnLst>
+                          </p:cTn>
+                        </p:par>
+                      </p:childTnLst>
+                    </p:cTn>
+                  </p:par>
+                  <p:par>
+                    <p:cTn id="9" fill="hold">
+                      <p:stCondLst>
+                        <p:cond delay="indefinite"/>
+                      </p:stCondLst>
+                      <p:childTnLst>
+                        <p:par>
+                          <p:cTn id="10" fill="hold">
+                            <p:stCondLst>
+                              <p:cond delay="0"/>
+                            </p:stCondLst>
+                            <p:childTnLst>
+                              <p:par>
+                                <p:cTn id="11" presetID="1" presetClass="entr" presetSubtype="0" fill="hold" nodeType="clickEffect">
+                                  <p:stCondLst>
+                                    <p:cond delay="0"/>
+                                  </p:stCondLst>
+                                  <p:childTnLst>
+                                    <p:set>
+                                      <p:cBhvr>
+                                        <p:cTn id="12" dur="1" fill="hold">
+                                          <p:stCondLst>
+                                            <p:cond delay="0"/>
+                                          </p:stCondLst>
+                                        </p:cTn>
+                                        <p:tgtEl>
+                                          <p:spTgt spid="3">
+                                            <p:txEl>
+                                              <p:pRg st="2" end="2"/>
+                                            </p:txEl>
+                                          </p:spTgt>
+                                        </p:tgtEl>
+                                        <p:attrNameLst>
+                                          <p:attrName>style.visibility</p:attrName>
+                                        </p:attrNameLst>
+                                      </p:cBhvr>
+                                      <p:to>
+                                        <p:strVal val="visible"/>
+                                      </p:to>
+                                    </p:set>
+                                  </p:childTnLst>
+                                </p:cTn>
+                              </p:par>
+                              <p:par>
+                                <p:cTn id="13" presetID="1" presetClass="entr" presetSubtype="0" fill="hold" nodeType="withEffect">
+                                  <p:stCondLst>
+                                    <p:cond delay="0"/>
+                                  </p:stCondLst>
+                                  <p:childTnLst>
+                                    <p:set>
+                                      <p:cBhvr>
+                                        <p:cTn id="14" dur="1" fill="hold">
+                                          <p:stCondLst>
+                                            <p:cond delay="0"/>
+                                          </p:stCondLst>
+                                        </p:cTn>
+                                        <p:tgtEl>
+                                          <p:spTgt spid="1026"/>
+                                        </p:tgtEl>
+                                        <p:attrNameLst>
+                                          <p:attrName>style.visibility</p:attrName>
+                                        </p:attrNameLst>
+                                      </p:cBhvr>
+                                      <p:to>
+                                        <p:strVal val="visible"/>
+                                      </p:to>
+                                    </p:set>
+                                  </p:childTnLst>
+                                </p:cTn>
+                              </p:par>
+                            </p:childTnLst>
+                          </p:cTn>
+                        </p:par>
+                      </p:childTnLst>
+                    </p:cTn>
+                  </p:par>
+                </p:childTnLst>
+              </p:cTn>
+              <p:prevCondLst>
+                <p:cond evt="onPrev" delay="0">
+                  <p:tgtEl>
+                    <p:sldTgt/>
+                  </p:tgtEl>
+                </p:cond>
+              </p:prevCondLst>
+              <p:nextCondLst>
+                <p:cond evt="onNext" delay="0">
+                  <p:tgtEl>
+                    <p:sldTgt/>
+                  </p:tgtEl>
+                </p:cond>
+              </p:nextCondLst>
+            </p:seq>
+          </p:childTnLst>
+        </p:cTn>
+      </p:par>
+    </p:tnLst>
+  </p:timing>
+</p:sld>
+</file>
+
+<file path=ppt/slides/slide11.xml><?xml version="1.0" encoding="utf-8"?>
+<p:sld xmlns:a="http://schemas.openxmlformats.org/drawingml/2006/main" xmlns:r="http://schemas.openxmlformats.org/officeDocument/2006/relationships" xmlns:p="http://schemas.openxmlformats.org/presentationml/2006/main">
+  <p:cSld>
+    <p:spTree>
+      <p:nvGrpSpPr>
+        <p:cNvPr id="1" name=""/>
+        <p:cNvGrpSpPr/>
+        <p:nvPr/>
+      </p:nvGrpSpPr>
+      <p:grpSpPr>
+        <a:xfrm>
+          <a:off x="0" y="0"/>
+          <a:ext cx="0" cy="0"/>
+          <a:chOff x="0" y="0"/>
+          <a:chExt cx="0" cy="0"/>
+        </a:xfrm>
+      </p:grpSpPr>
+      <p:pic>
+        <p:nvPicPr>
+          <p:cNvPr id="6" name="Picture 5"/>
           <p:cNvPicPr>
             <a:picLocks noChangeAspect="1"/>
           </p:cNvPicPr>
@@ -7266,21 +7641,122 @@
         </p:blipFill>
         <p:spPr>
           <a:xfrm>
-            <a:off x="1172829" y="2630266"/>
-            <a:ext cx="9846343" cy="4094625"/>
+            <a:off x="2630208" y="2620811"/>
+            <a:ext cx="6931584" cy="4088630"/>
           </a:xfrm>
           <a:prstGeom prst="rect">
             <a:avLst/>
           </a:prstGeom>
-          <a:ln>
-            <a:solidFill>
-              <a:schemeClr val="bg2">
-                <a:lumMod val="75000"/>
-              </a:schemeClr>
-            </a:solidFill>
-          </a:ln>
         </p:spPr>
       </p:pic>
+      <p:sp>
+        <p:nvSpPr>
+          <p:cNvPr id="2" name="Slide Number Placeholder 1"/>
+          <p:cNvSpPr>
+            <a:spLocks noGrp="1"/>
+          </p:cNvSpPr>
+          <p:nvPr>
+            <p:ph type="sldNum" sz="quarter" idx="5"/>
+          </p:nvPr>
+        </p:nvSpPr>
+        <p:spPr/>
+        <p:txBody>
+          <a:bodyPr/>
+          <a:lstStyle/>
+          <a:p>
+            <a:fld id="{2BF067CD-8E6B-4360-9AA8-C5DF2A48A6D1}" type="slidenum">
+              <a:rPr lang="en-US" noProof="0" smtClean="0"/>
+              <a:pPr/>
+              <a:t>11</a:t>
+            </a:fld>
+            <a:endParaRPr lang="en-US" noProof="0" dirty="0"/>
+          </a:p>
+        </p:txBody>
+      </p:sp>
+      <p:sp>
+        <p:nvSpPr>
+          <p:cNvPr id="3" name="Text Placeholder 2"/>
+          <p:cNvSpPr>
+            <a:spLocks noGrp="1"/>
+          </p:cNvSpPr>
+          <p:nvPr>
+            <p:ph type="body" sz="quarter" idx="10"/>
+          </p:nvPr>
+        </p:nvSpPr>
+        <p:spPr/>
+        <p:txBody>
+          <a:bodyPr/>
+          <a:lstStyle/>
+          <a:p>
+            <a:pPr>
+              <a:spcBef>
+                <a:spcPts val="0"/>
+              </a:spcBef>
+              <a:spcAft>
+                <a:spcPts val="0"/>
+              </a:spcAft>
+            </a:pPr>
+            <a:r>
+              <a:rPr lang="bg-BG" sz="3600" dirty="0"/>
+              <a:t>Ако </a:t>
+            </a:r>
+            <a:r>
+              <a:rPr lang="bg-BG" sz="3600" b="1" dirty="0"/>
+              <a:t>няма грешки</a:t>
+            </a:r>
+            <a:r>
+              <a:rPr lang="bg-BG" sz="3600" dirty="0"/>
+              <a:t>, програмата ще се изпълни</a:t>
+            </a:r>
+          </a:p>
+          <a:p>
+            <a:pPr>
+              <a:spcBef>
+                <a:spcPts val="0"/>
+              </a:spcBef>
+              <a:spcAft>
+                <a:spcPts val="0"/>
+              </a:spcAft>
+            </a:pPr>
+            <a:r>
+              <a:rPr lang="bg-BG" sz="3600" dirty="0"/>
+              <a:t>Резултатът ще се изпише на </a:t>
+            </a:r>
+            <a:r>
+              <a:rPr lang="bg-BG" sz="3600" b="1" dirty="0" smtClean="0"/>
+              <a:t>конзолата</a:t>
+            </a:r>
+            <a:r>
+              <a:rPr lang="bg-BG" sz="3600" dirty="0" smtClean="0"/>
+              <a:t>:</a:t>
+            </a:r>
+            <a:endParaRPr lang="en-US" sz="3600" dirty="0"/>
+          </a:p>
+        </p:txBody>
+      </p:sp>
+      <p:sp>
+        <p:nvSpPr>
+          <p:cNvPr id="4" name="Title 3"/>
+          <p:cNvSpPr>
+            <a:spLocks noGrp="1"/>
+          </p:cNvSpPr>
+          <p:nvPr>
+            <p:ph type="title"/>
+          </p:nvPr>
+        </p:nvSpPr>
+        <p:spPr/>
+        <p:txBody>
+          <a:bodyPr/>
+          <a:lstStyle/>
+          <a:p>
+            <a:r>
+              <a:rPr lang="bg-BG" dirty="0"/>
+              <a:t>Резултат от стартиране на програмата</a:t>
+            </a:r>
+            <a:endParaRPr lang="en-US" dirty="0"/>
+          </a:p>
+        </p:txBody>
+      </p:sp>
       <p:cxnSp>
         <p:nvCxnSpPr>
           <p:cNvPr id="9" name="Straight Arrow Connector 8"/>
@@ -7288,9 +7764,9 @@
           <p:nvPr/>
         </p:nvCxnSpPr>
         <p:spPr>
-          <a:xfrm flipH="1" flipV="1">
-            <a:off x="2631000" y="5004000"/>
-            <a:ext cx="855000" cy="225000"/>
+          <a:xfrm flipH="1">
+            <a:off x="4161000" y="5589000"/>
+            <a:ext cx="1164703" cy="405000"/>
           </a:xfrm>
           <a:prstGeom prst="straightConnector1">
             <a:avLst/>
@@ -7415,7 +7891,7 @@
                                           </p:stCondLst>
                                         </p:cTn>
                                         <p:tgtEl>
-                                          <p:spTgt spid="5"/>
+                                          <p:spTgt spid="6"/>
                                         </p:tgtEl>
                                         <p:attrNameLst>
                                           <p:attrName>style.visibility</p:attrName>
@@ -7504,7 +7980,7 @@
 </p:sld>
 </file>
 
-<file path=ppt/slides/slide11.xml><?xml version="1.0" encoding="utf-8"?>
+<file path=ppt/slides/slide12.xml><?xml version="1.0" encoding="utf-8"?>
 <p:sld xmlns:a="http://schemas.openxmlformats.org/drawingml/2006/main" xmlns:r="http://schemas.openxmlformats.org/officeDocument/2006/relationships" xmlns:p="http://schemas.openxmlformats.org/presentationml/2006/main">
   <p:cSld>
     <p:spTree>
@@ -7539,7 +8015,7 @@
             <a:fld id="{2BF067CD-8E6B-4360-9AA8-C5DF2A48A6D1}" type="slidenum">
               <a:rPr lang="en-US" noProof="0" smtClean="0"/>
               <a:pPr/>
-              <a:t>11</a:t>
+              <a:t>12</a:t>
             </a:fld>
             <a:endParaRPr lang="en-US" noProof="0" dirty="0"/>
           </a:p>
@@ -7982,7 +8458,7 @@
 </p:sld>
 </file>
 
-<file path=ppt/slides/slide12.xml><?xml version="1.0" encoding="utf-8"?>
+<file path=ppt/slides/slide13.xml><?xml version="1.0" encoding="utf-8"?>
 <p:sld xmlns:a="http://schemas.openxmlformats.org/drawingml/2006/main" xmlns:r="http://schemas.openxmlformats.org/officeDocument/2006/relationships" xmlns:p="http://schemas.openxmlformats.org/presentationml/2006/main">
   <p:cSld>
     <p:spTree>
@@ -8095,7 +8571,7 @@
 </p:sld>
 </file>
 
-<file path=ppt/slides/slide13.xml><?xml version="1.0" encoding="utf-8"?>
+<file path=ppt/slides/slide14.xml><?xml version="1.0" encoding="utf-8"?>
 <p:sld xmlns:a="http://schemas.openxmlformats.org/drawingml/2006/main" xmlns:r="http://schemas.openxmlformats.org/officeDocument/2006/relationships" xmlns:p="http://schemas.openxmlformats.org/presentationml/2006/main">
   <p:cSld>
     <p:spTree>
@@ -8555,18 +9031,6 @@
               </a:rPr>
               <a:t>Име на променлива</a:t>
             </a:r>
-            <a:endParaRPr lang="bg-BG" sz="2800" b="1" dirty="0">
-              <a:solidFill>
-                <a:srgbClr val="FFFFFF"/>
-              </a:solidFill>
-              <a:effectLst>
-                <a:outerShdw blurRad="38100" dist="38100" dir="2700000" algn="tl">
-                  <a:srgbClr val="000000">
-                    <a:alpha val="43137"/>
-                  </a:srgbClr>
-                </a:outerShdw>
-              </a:effectLst>
-            </a:endParaRPr>
           </a:p>
         </p:txBody>
       </p:sp>
@@ -8644,18 +9108,6 @@
               </a:rPr>
               <a:t>Стойност (от тип число)</a:t>
             </a:r>
-            <a:endParaRPr lang="bg-BG" sz="2800" b="1" dirty="0">
-              <a:solidFill>
-                <a:srgbClr val="FFFFFF"/>
-              </a:solidFill>
-              <a:effectLst>
-                <a:outerShdw blurRad="38100" dist="38100" dir="2700000" algn="tl">
-                  <a:srgbClr val="000000">
-                    <a:alpha val="43137"/>
-                  </a:srgbClr>
-                </a:outerShdw>
-              </a:effectLst>
-            </a:endParaRPr>
           </a:p>
         </p:txBody>
       </p:sp>
@@ -9280,7 +9732,7 @@
 </p:sld>
 </file>
 
-<file path=ppt/slides/slide14.xml><?xml version="1.0" encoding="utf-8"?>
+<file path=ppt/slides/slide15.xml><?xml version="1.0" encoding="utf-8"?>
 <p:sld xmlns:a="http://schemas.openxmlformats.org/drawingml/2006/main" xmlns:r="http://schemas.openxmlformats.org/officeDocument/2006/relationships" xmlns:p="http://schemas.openxmlformats.org/presentationml/2006/main">
   <p:cSld>
     <p:spTree>
@@ -9315,7 +9767,7 @@
             <a:fld id="{2BF067CD-8E6B-4360-9AA8-C5DF2A48A6D1}" type="slidenum">
               <a:rPr lang="en-US" noProof="0" smtClean="0"/>
               <a:pPr/>
-              <a:t>14</a:t>
+              <a:t>15</a:t>
             </a:fld>
             <a:endParaRPr lang="en-US" noProof="0" dirty="0"/>
           </a:p>
@@ -10191,7 +10643,7 @@
 </p:sld>
 </file>
 
-<file path=ppt/slides/slide15.xml><?xml version="1.0" encoding="utf-8"?>
+<file path=ppt/slides/slide16.xml><?xml version="1.0" encoding="utf-8"?>
 <p:sld xmlns:a="http://schemas.openxmlformats.org/drawingml/2006/main" xmlns:r="http://schemas.openxmlformats.org/officeDocument/2006/relationships" xmlns:p="http://schemas.openxmlformats.org/presentationml/2006/main">
   <p:cSld>
     <p:spTree>
@@ -10316,7 +10768,7 @@
 </p:sld>
 </file>
 
-<file path=ppt/slides/slide16.xml><?xml version="1.0" encoding="utf-8"?>
+<file path=ppt/slides/slide17.xml><?xml version="1.0" encoding="utf-8"?>
 <p:sld xmlns:a="http://schemas.openxmlformats.org/drawingml/2006/main" xmlns:r="http://schemas.openxmlformats.org/officeDocument/2006/relationships" xmlns:p="http://schemas.openxmlformats.org/presentationml/2006/main">
   <p:cSld>
     <p:spTree>
@@ -10810,7 +11262,7 @@
 </p:sld>
 </file>
 
-<file path=ppt/slides/slide17.xml><?xml version="1.0" encoding="utf-8"?>
+<file path=ppt/slides/slide18.xml><?xml version="1.0" encoding="utf-8"?>
 <p:sld xmlns:a="http://schemas.openxmlformats.org/drawingml/2006/main" xmlns:r="http://schemas.openxmlformats.org/officeDocument/2006/relationships" xmlns:p="http://schemas.openxmlformats.org/presentationml/2006/main">
   <p:cSld>
     <p:spTree>
@@ -10845,7 +11297,7 @@
             <a:fld id="{2BF067CD-8E6B-4360-9AA8-C5DF2A48A6D1}" type="slidenum">
               <a:rPr lang="en-US" noProof="0" smtClean="0"/>
               <a:pPr/>
-              <a:t>17</a:t>
+              <a:t>18</a:t>
             </a:fld>
             <a:endParaRPr lang="en-US" noProof="0" dirty="0"/>
           </a:p>
@@ -11059,9 +11511,6 @@
               </a:rPr>
               <a:t>print(name)</a:t>
             </a:r>
-            <a:endParaRPr lang="en-US" sz="2400" b="1" dirty="0">
-              <a:latin typeface="Consolas" panose="020B0609020204030204" pitchFamily="49" charset="0"/>
-            </a:endParaRPr>
           </a:p>
         </p:txBody>
       </p:sp>
@@ -11670,7 +12119,7 @@
 </p:sld>
 </file>
 
-<file path=ppt/slides/slide18.xml><?xml version="1.0" encoding="utf-8"?>
+<file path=ppt/slides/slide19.xml><?xml version="1.0" encoding="utf-8"?>
 <p:sld xmlns:a="http://schemas.openxmlformats.org/drawingml/2006/main" xmlns:r="http://schemas.openxmlformats.org/officeDocument/2006/relationships" xmlns:p="http://schemas.openxmlformats.org/presentationml/2006/main">
   <p:cSld>
     <p:spTree>
@@ -11705,7 +12154,7 @@
             <a:fld id="{2BF067CD-8E6B-4360-9AA8-C5DF2A48A6D1}" type="slidenum">
               <a:rPr lang="en-US" noProof="0" smtClean="0"/>
               <a:pPr/>
-              <a:t>18</a:t>
+              <a:t>19</a:t>
             </a:fld>
             <a:endParaRPr lang="en-US" noProof="0" dirty="0"/>
           </a:p>
@@ -11891,13 +12340,6 @@
               </a:rPr>
               <a:t>)</a:t>
             </a:r>
-            <a:endParaRPr lang="en-US" sz="2400" b="1" dirty="0">
-              <a:solidFill>
-                <a:schemeClr val="bg1"/>
-              </a:solidFill>
-              <a:latin typeface="Consolas" panose="020B0609020204030204" pitchFamily="49" charset="0"/>
-              <a:cs typeface="Consolas" panose="020B0609020204030204" pitchFamily="49" charset="0"/>
-            </a:endParaRPr>
           </a:p>
         </p:txBody>
       </p:sp>
@@ -12200,131 +12642,6 @@
       <p:bldP spid="11" grpId="0" animBg="1"/>
       <p:bldP spid="14" grpId="0" animBg="1"/>
     </p:bldLst>
-  </p:timing>
-</p:sld>
-</file>
-
-<file path=ppt/slides/slide19.xml><?xml version="1.0" encoding="utf-8"?>
-<p:sld xmlns:a="http://schemas.openxmlformats.org/drawingml/2006/main" xmlns:r="http://schemas.openxmlformats.org/officeDocument/2006/relationships" xmlns:p="http://schemas.openxmlformats.org/presentationml/2006/main">
-  <p:cSld>
-    <p:spTree>
-      <p:nvGrpSpPr>
-        <p:cNvPr id="1" name=""/>
-        <p:cNvGrpSpPr/>
-        <p:nvPr/>
-      </p:nvGrpSpPr>
-      <p:grpSpPr>
-        <a:xfrm>
-          <a:off x="0" y="0"/>
-          <a:ext cx="0" cy="0"/>
-          <a:chOff x="0" y="0"/>
-          <a:chExt cx="0" cy="0"/>
-        </a:xfrm>
-      </p:grpSpPr>
-      <p:sp>
-        <p:nvSpPr>
-          <p:cNvPr id="6" name="Subtitle 5"/>
-          <p:cNvSpPr>
-            <a:spLocks noGrp="1"/>
-          </p:cNvSpPr>
-          <p:nvPr>
-            <p:ph type="subTitle" sz="quarter" idx="11"/>
-          </p:nvPr>
-        </p:nvSpPr>
-        <p:spPr/>
-        <p:txBody>
-          <a:bodyPr/>
-          <a:lstStyle/>
-          <a:p>
-            <a:r>
-              <a:rPr lang="ru-RU" dirty="0"/>
-              <a:t>Работа с текст и </a:t>
-            </a:r>
-            <a:r>
-              <a:rPr lang="ru-RU" dirty="0" smtClean="0"/>
-              <a:t>числа</a:t>
-            </a:r>
-            <a:endParaRPr lang="bg-BG" dirty="0"/>
-          </a:p>
-        </p:txBody>
-      </p:sp>
-      <p:sp>
-        <p:nvSpPr>
-          <p:cNvPr id="5" name="Title 4"/>
-          <p:cNvSpPr>
-            <a:spLocks noGrp="1"/>
-          </p:cNvSpPr>
-          <p:nvPr>
-            <p:ph type="title" sz="quarter" idx="10"/>
-          </p:nvPr>
-        </p:nvSpPr>
-        <p:spPr/>
-        <p:txBody>
-          <a:bodyPr/>
-          <a:lstStyle/>
-          <a:p>
-            <a:r>
-              <a:rPr lang="bg-BG" dirty="0"/>
-              <a:t>Прости операции</a:t>
-            </a:r>
-            <a:endParaRPr lang="en-US" dirty="0"/>
-          </a:p>
-        </p:txBody>
-      </p:sp>
-      <p:pic>
-        <p:nvPicPr>
-          <p:cNvPr id="7" name="Picture 6"/>
-          <p:cNvPicPr>
-            <a:picLocks noChangeAspect="1"/>
-          </p:cNvPicPr>
-          <p:nvPr/>
-        </p:nvPicPr>
-        <p:blipFill>
-          <a:blip r:embed="rId2" cstate="print">
-            <a:extLst>
-              <a:ext uri="{28A0092B-C50C-407E-A947-70E740481C1C}">
-                <a14:useLocalDpi xmlns:a14="http://schemas.microsoft.com/office/drawing/2010/main" val="0"/>
-              </a:ext>
-            </a:extLst>
-          </a:blip>
-          <a:stretch>
-            <a:fillRect/>
-          </a:stretch>
-        </p:blipFill>
-        <p:spPr>
-          <a:xfrm>
-            <a:off x="4977445" y="1524000"/>
-            <a:ext cx="2237110" cy="2237110"/>
-          </a:xfrm>
-          <a:prstGeom prst="rect">
-            <a:avLst/>
-          </a:prstGeom>
-        </p:spPr>
-      </p:pic>
-    </p:spTree>
-    <p:extLst>
-      <p:ext uri="{BB962C8B-B14F-4D97-AF65-F5344CB8AC3E}">
-        <p14:creationId xmlns:p14="http://schemas.microsoft.com/office/powerpoint/2010/main" val="4279463294"/>
-      </p:ext>
-    </p:extLst>
-  </p:cSld>
-  <p:clrMapOvr>
-    <a:masterClrMapping/>
-  </p:clrMapOvr>
-  <mc:AlternateContent xmlns:mc="http://schemas.openxmlformats.org/markup-compatibility/2006" xmlns:p14="http://schemas.microsoft.com/office/powerpoint/2010/main">
-    <mc:Choice Requires="p14">
-      <p:transition spd="slow" p14:dur="2000" advClick="0" advTm="5000"/>
-    </mc:Choice>
-    <mc:Fallback xmlns="">
-      <p:transition spd="slow" advClick="0" advTm="5000"/>
-    </mc:Fallback>
-  </mc:AlternateContent>
-  <p:timing>
-    <p:tnLst>
-      <p:par>
-        <p:cTn id="1" dur="indefinite" restart="never" nodeType="tmRoot"/>
-      </p:par>
-    </p:tnLst>
   </p:timing>
 </p:sld>
 </file>
@@ -12995,6 +13312,131 @@
 </file>
 
 <file path=ppt/slides/slide20.xml><?xml version="1.0" encoding="utf-8"?>
+<p:sld xmlns:a="http://schemas.openxmlformats.org/drawingml/2006/main" xmlns:r="http://schemas.openxmlformats.org/officeDocument/2006/relationships" xmlns:p="http://schemas.openxmlformats.org/presentationml/2006/main">
+  <p:cSld>
+    <p:spTree>
+      <p:nvGrpSpPr>
+        <p:cNvPr id="1" name=""/>
+        <p:cNvGrpSpPr/>
+        <p:nvPr/>
+      </p:nvGrpSpPr>
+      <p:grpSpPr>
+        <a:xfrm>
+          <a:off x="0" y="0"/>
+          <a:ext cx="0" cy="0"/>
+          <a:chOff x="0" y="0"/>
+          <a:chExt cx="0" cy="0"/>
+        </a:xfrm>
+      </p:grpSpPr>
+      <p:sp>
+        <p:nvSpPr>
+          <p:cNvPr id="6" name="Subtitle 5"/>
+          <p:cNvSpPr>
+            <a:spLocks noGrp="1"/>
+          </p:cNvSpPr>
+          <p:nvPr>
+            <p:ph type="subTitle" sz="quarter" idx="11"/>
+          </p:nvPr>
+        </p:nvSpPr>
+        <p:spPr/>
+        <p:txBody>
+          <a:bodyPr/>
+          <a:lstStyle/>
+          <a:p>
+            <a:r>
+              <a:rPr lang="ru-RU" dirty="0"/>
+              <a:t>Работа с текст и </a:t>
+            </a:r>
+            <a:r>
+              <a:rPr lang="ru-RU" dirty="0" smtClean="0"/>
+              <a:t>числа</a:t>
+            </a:r>
+            <a:endParaRPr lang="bg-BG" dirty="0"/>
+          </a:p>
+        </p:txBody>
+      </p:sp>
+      <p:sp>
+        <p:nvSpPr>
+          <p:cNvPr id="5" name="Title 4"/>
+          <p:cNvSpPr>
+            <a:spLocks noGrp="1"/>
+          </p:cNvSpPr>
+          <p:nvPr>
+            <p:ph type="title" sz="quarter" idx="10"/>
+          </p:nvPr>
+        </p:nvSpPr>
+        <p:spPr/>
+        <p:txBody>
+          <a:bodyPr/>
+          <a:lstStyle/>
+          <a:p>
+            <a:r>
+              <a:rPr lang="bg-BG" dirty="0"/>
+              <a:t>Прости операции</a:t>
+            </a:r>
+            <a:endParaRPr lang="en-US" dirty="0"/>
+          </a:p>
+        </p:txBody>
+      </p:sp>
+      <p:pic>
+        <p:nvPicPr>
+          <p:cNvPr id="7" name="Picture 6"/>
+          <p:cNvPicPr>
+            <a:picLocks noChangeAspect="1"/>
+          </p:cNvPicPr>
+          <p:nvPr/>
+        </p:nvPicPr>
+        <p:blipFill>
+          <a:blip r:embed="rId2" cstate="print">
+            <a:extLst>
+              <a:ext uri="{28A0092B-C50C-407E-A947-70E740481C1C}">
+                <a14:useLocalDpi xmlns:a14="http://schemas.microsoft.com/office/drawing/2010/main" val="0"/>
+              </a:ext>
+            </a:extLst>
+          </a:blip>
+          <a:stretch>
+            <a:fillRect/>
+          </a:stretch>
+        </p:blipFill>
+        <p:spPr>
+          <a:xfrm>
+            <a:off x="4977445" y="1524000"/>
+            <a:ext cx="2237110" cy="2237110"/>
+          </a:xfrm>
+          <a:prstGeom prst="rect">
+            <a:avLst/>
+          </a:prstGeom>
+        </p:spPr>
+      </p:pic>
+    </p:spTree>
+    <p:extLst>
+      <p:ext uri="{BB962C8B-B14F-4D97-AF65-F5344CB8AC3E}">
+        <p14:creationId xmlns:p14="http://schemas.microsoft.com/office/powerpoint/2010/main" val="4279463294"/>
+      </p:ext>
+    </p:extLst>
+  </p:cSld>
+  <p:clrMapOvr>
+    <a:masterClrMapping/>
+  </p:clrMapOvr>
+  <mc:AlternateContent xmlns:mc="http://schemas.openxmlformats.org/markup-compatibility/2006" xmlns:p14="http://schemas.microsoft.com/office/powerpoint/2010/main">
+    <mc:Choice Requires="p14">
+      <p:transition spd="slow" p14:dur="2000" advClick="0" advTm="5000"/>
+    </mc:Choice>
+    <mc:Fallback xmlns="">
+      <p:transition spd="slow" advClick="0" advTm="5000"/>
+    </mc:Fallback>
+  </mc:AlternateContent>
+  <p:timing>
+    <p:tnLst>
+      <p:par>
+        <p:cTn id="1" dur="indefinite" restart="never" nodeType="tmRoot"/>
+      </p:par>
+    </p:tnLst>
+  </p:timing>
+</p:sld>
+</file>
+
+<file path=ppt/slides/slide21.xml><?xml version="1.0" encoding="utf-8"?>
 <p:sld xmlns:a="http://schemas.openxmlformats.org/drawingml/2006/main" xmlns:r="http://schemas.openxmlformats.org/officeDocument/2006/relationships" xmlns:p="http://schemas.openxmlformats.org/presentationml/2006/main">
   <p:cSld>
     <p:spTree>
@@ -14068,7 +14510,7 @@
 </p:sld>
 </file>
 
-<file path=ppt/slides/slide21.xml><?xml version="1.0" encoding="utf-8"?>
+<file path=ppt/slides/slide22.xml><?xml version="1.0" encoding="utf-8"?>
 <p:sld xmlns:a="http://schemas.openxmlformats.org/drawingml/2006/main" xmlns:r="http://schemas.openxmlformats.org/officeDocument/2006/relationships" xmlns:p="http://schemas.openxmlformats.org/presentationml/2006/main">
   <p:cSld>
     <p:spTree>
@@ -14103,7 +14545,7 @@
             <a:fld id="{2BF067CD-8E6B-4360-9AA8-C5DF2A48A6D1}" type="slidenum">
               <a:rPr lang="en-US" noProof="0" smtClean="0"/>
               <a:pPr/>
-              <a:t>21</a:t>
+              <a:t>22</a:t>
             </a:fld>
             <a:endParaRPr lang="en-US" noProof="0" dirty="0"/>
           </a:p>
@@ -14275,9 +14717,6 @@
               </a:rPr>
               <a:t>(name)</a:t>
             </a:r>
-            <a:endParaRPr lang="en-US" sz="3200" b="1" dirty="0">
-              <a:latin typeface="Consolas" panose="020B0609020204030204" pitchFamily="49" charset="0"/>
-            </a:endParaRPr>
           </a:p>
         </p:txBody>
       </p:sp>
@@ -14389,9 +14828,6 @@
               </a:rPr>
               <a:t> name)</a:t>
             </a:r>
-            <a:endParaRPr lang="en-US" sz="3200" b="1" dirty="0">
-              <a:latin typeface="Consolas" panose="020B0609020204030204" pitchFamily="49" charset="0"/>
-            </a:endParaRPr>
           </a:p>
         </p:txBody>
       </p:sp>
@@ -14470,11 +14906,6 @@
               </a:rPr>
               <a:t>същия ред</a:t>
             </a:r>
-            <a:endParaRPr lang="bg-BG" sz="2800" b="1" dirty="0">
-              <a:solidFill>
-                <a:schemeClr val="bg2"/>
-              </a:solidFill>
-            </a:endParaRPr>
           </a:p>
         </p:txBody>
       </p:sp>
@@ -14814,7 +15245,7 @@
 </p:sld>
 </file>
 
-<file path=ppt/slides/slide22.xml><?xml version="1.0" encoding="utf-8"?>
+<file path=ppt/slides/slide23.xml><?xml version="1.0" encoding="utf-8"?>
 <p:sld xmlns:a="http://schemas.openxmlformats.org/drawingml/2006/main" xmlns:r="http://schemas.openxmlformats.org/officeDocument/2006/relationships" xmlns:p="http://schemas.openxmlformats.org/presentationml/2006/main">
   <p:cSld>
     <p:spTree>
@@ -14849,7 +15280,7 @@
             <a:fld id="{2BF067CD-8E6B-4360-9AA8-C5DF2A48A6D1}" type="slidenum">
               <a:rPr lang="en-US" noProof="0" smtClean="0"/>
               <a:pPr/>
-              <a:t>22</a:t>
+              <a:t>23</a:t>
             </a:fld>
             <a:endParaRPr lang="en-US" noProof="0" dirty="0"/>
           </a:p>
@@ -16402,7 +16833,7 @@
 </p:sld>
 </file>
 
-<file path=ppt/slides/slide23.xml><?xml version="1.0" encoding="utf-8"?>
+<file path=ppt/slides/slide24.xml><?xml version="1.0" encoding="utf-8"?>
 <p:sld xmlns:a="http://schemas.openxmlformats.org/drawingml/2006/main" xmlns:r="http://schemas.openxmlformats.org/officeDocument/2006/relationships" xmlns:p="http://schemas.openxmlformats.org/presentationml/2006/main">
   <p:cSld>
     <p:spTree>
@@ -16437,7 +16868,7 @@
             <a:fld id="{2BF067CD-8E6B-4360-9AA8-C5DF2A48A6D1}" type="slidenum">
               <a:rPr lang="en-US" noProof="0" smtClean="0"/>
               <a:pPr/>
-              <a:t>23</a:t>
+              <a:t>24</a:t>
             </a:fld>
             <a:endParaRPr lang="en-US" noProof="0" dirty="0"/>
           </a:p>
@@ -17529,7 +17960,7 @@
 </p:sld>
 </file>
 
-<file path=ppt/slides/slide24.xml><?xml version="1.0" encoding="utf-8"?>
+<file path=ppt/slides/slide25.xml><?xml version="1.0" encoding="utf-8"?>
 <p:sld xmlns:a="http://schemas.openxmlformats.org/drawingml/2006/main" xmlns:r="http://schemas.openxmlformats.org/officeDocument/2006/relationships" xmlns:p="http://schemas.openxmlformats.org/presentationml/2006/main">
   <p:cSld>
     <p:spTree>
@@ -17564,7 +17995,7 @@
             <a:fld id="{2BF067CD-8E6B-4360-9AA8-C5DF2A48A6D1}" type="slidenum">
               <a:rPr lang="en-US" noProof="0" smtClean="0"/>
               <a:pPr/>
-              <a:t>24</a:t>
+              <a:t>25</a:t>
             </a:fld>
             <a:endParaRPr lang="en-US" noProof="0" dirty="0"/>
           </a:p>
@@ -19029,7 +19460,7 @@
 </p:sld>
 </file>
 
-<file path=ppt/slides/slide25.xml><?xml version="1.0" encoding="utf-8"?>
+<file path=ppt/slides/slide26.xml><?xml version="1.0" encoding="utf-8"?>
 <p:sld xmlns:a="http://schemas.openxmlformats.org/drawingml/2006/main" xmlns:r="http://schemas.openxmlformats.org/officeDocument/2006/relationships" xmlns:p="http://schemas.openxmlformats.org/presentationml/2006/main">
   <p:cSld>
     <p:spTree>
@@ -19064,7 +19495,7 @@
             <a:fld id="{2BF067CD-8E6B-4360-9AA8-C5DF2A48A6D1}" type="slidenum">
               <a:rPr lang="en-US" noProof="0" smtClean="0"/>
               <a:pPr/>
-              <a:t>25</a:t>
+              <a:t>26</a:t>
             </a:fld>
             <a:endParaRPr lang="en-US" noProof="0" dirty="0"/>
           </a:p>
@@ -20399,7 +20830,7 @@
 </p:sld>
 </file>
 
-<file path=ppt/slides/slide26.xml><?xml version="1.0" encoding="utf-8"?>
+<file path=ppt/slides/slide27.xml><?xml version="1.0" encoding="utf-8"?>
 <p:sld xmlns:a="http://schemas.openxmlformats.org/drawingml/2006/main" xmlns:r="http://schemas.openxmlformats.org/officeDocument/2006/relationships" xmlns:p="http://schemas.openxmlformats.org/presentationml/2006/main">
   <p:cSld>
     <p:spTree>
@@ -20575,7 +21006,7 @@
 </p:sld>
 </file>
 
-<file path=ppt/slides/slide27.xml><?xml version="1.0" encoding="utf-8"?>
+<file path=ppt/slides/slide28.xml><?xml version="1.0" encoding="utf-8"?>
 <p:sld xmlns:a="http://schemas.openxmlformats.org/drawingml/2006/main" xmlns:r="http://schemas.openxmlformats.org/officeDocument/2006/relationships" xmlns:p="http://schemas.openxmlformats.org/presentationml/2006/main">
   <p:cSld>
     <p:spTree>
@@ -21057,11 +21488,6 @@
               </a:rPr>
               <a:t>В къдравите скоби поставяме името на променливата</a:t>
             </a:r>
-            <a:endParaRPr lang="bg-BG" sz="2800" b="1" dirty="0">
-              <a:solidFill>
-                <a:srgbClr val="FFFFFF"/>
-              </a:solidFill>
-            </a:endParaRPr>
           </a:p>
         </p:txBody>
       </p:sp>
@@ -21360,7 +21786,7 @@
 </p:sld>
 </file>
 
-<file path=ppt/slides/slide28.xml><?xml version="1.0" encoding="utf-8"?>
+<file path=ppt/slides/slide29.xml><?xml version="1.0" encoding="utf-8"?>
 <p:sld xmlns:a="http://schemas.openxmlformats.org/drawingml/2006/main" xmlns:r="http://schemas.openxmlformats.org/officeDocument/2006/relationships" xmlns:p="http://schemas.openxmlformats.org/presentationml/2006/main">
   <p:cSld>
     <p:spTree>
@@ -21395,7 +21821,7 @@
             <a:fld id="{2BF067CD-8E6B-4360-9AA8-C5DF2A48A6D1}" type="slidenum">
               <a:rPr lang="en-US" noProof="0" smtClean="0"/>
               <a:pPr/>
-              <a:t>28</a:t>
+              <a:t>29</a:t>
             </a:fld>
             <a:endParaRPr lang="en-US" noProof="0" dirty="0"/>
           </a:p>
@@ -22205,7 +22631,123 @@
 </p:sld>
 </file>
 
-<file path=ppt/slides/slide29.xml><?xml version="1.0" encoding="utf-8"?>
+<file path=ppt/slides/slide3.xml><?xml version="1.0" encoding="utf-8"?>
+<p:sld xmlns:a="http://schemas.openxmlformats.org/drawingml/2006/main" xmlns:r="http://schemas.openxmlformats.org/officeDocument/2006/relationships" xmlns:p="http://schemas.openxmlformats.org/presentationml/2006/main">
+  <p:cSld>
+    <p:spTree>
+      <p:nvGrpSpPr>
+        <p:cNvPr id="1" name=""/>
+        <p:cNvGrpSpPr/>
+        <p:nvPr/>
+      </p:nvGrpSpPr>
+      <p:grpSpPr>
+        <a:xfrm>
+          <a:off x="0" y="0"/>
+          <a:ext cx="0" cy="0"/>
+          <a:chOff x="0" y="0"/>
+          <a:chExt cx="0" cy="0"/>
+        </a:xfrm>
+      </p:grpSpPr>
+      <p:sp>
+        <p:nvSpPr>
+          <p:cNvPr id="5" name="Title 4"/>
+          <p:cNvSpPr>
+            <a:spLocks noGrp="1"/>
+          </p:cNvSpPr>
+          <p:nvPr>
+            <p:ph type="title" sz="quarter" idx="10"/>
+          </p:nvPr>
+        </p:nvSpPr>
+        <p:spPr>
+          <a:xfrm>
+            <a:off x="615109" y="5135916"/>
+            <a:ext cx="10961783" cy="768084"/>
+          </a:xfrm>
+        </p:spPr>
+        <p:txBody>
+          <a:bodyPr/>
+          <a:lstStyle/>
+          <a:p>
+            <a:r>
+              <a:rPr lang="bg-BG" dirty="0" smtClean="0"/>
+              <a:t>Интересни факти за ͏</a:t>
+            </a:r>
+            <a:r>
+              <a:rPr lang="en-US" dirty="0" smtClean="0"/>
+              <a:t>Python</a:t>
+            </a:r>
+            <a:endParaRPr lang="en-US" dirty="0"/>
+          </a:p>
+        </p:txBody>
+      </p:sp>
+      <p:pic>
+        <p:nvPicPr>
+          <p:cNvPr id="1026" name="Picture 2" descr="undefined"/>
+          <p:cNvPicPr>
+            <a:picLocks noChangeAspect="1" noChangeArrowheads="1"/>
+          </p:cNvPicPr>
+          <p:nvPr/>
+        </p:nvPicPr>
+        <p:blipFill rotWithShape="1">
+          <a:blip r:embed="rId2" cstate="hqprint">
+            <a:extLst>
+              <a:ext uri="{28A0092B-C50C-407E-A947-70E740481C1C}">
+                <a14:useLocalDpi xmlns:a14="http://schemas.microsoft.com/office/drawing/2010/main" val="0"/>
+              </a:ext>
+            </a:extLst>
+          </a:blip>
+          <a:srcRect r="7878" b="14042"/>
+          <a:stretch/>
+        </p:blipFill>
+        <p:spPr bwMode="auto">
+          <a:xfrm>
+            <a:off x="5106000" y="1630172"/>
+            <a:ext cx="1980000" cy="2025000"/>
+          </a:xfrm>
+          <a:prstGeom prst="rect">
+            <a:avLst/>
+          </a:prstGeom>
+          <a:noFill/>
+          <a:extLst>
+            <a:ext uri="{909E8E84-426E-40DD-AFC4-6F175D3DCCD1}">
+              <a14:hiddenFill xmlns:a14="http://schemas.microsoft.com/office/drawing/2010/main">
+                <a:solidFill>
+                  <a:srgbClr val="FFFFFF"/>
+                </a:solidFill>
+              </a14:hiddenFill>
+            </a:ext>
+          </a:extLst>
+        </p:spPr>
+      </p:pic>
+    </p:spTree>
+    <p:extLst>
+      <p:ext uri="{BB962C8B-B14F-4D97-AF65-F5344CB8AC3E}">
+        <p14:creationId xmlns:p14="http://schemas.microsoft.com/office/powerpoint/2010/main" val="1084234799"/>
+      </p:ext>
+    </p:extLst>
+  </p:cSld>
+  <p:clrMapOvr>
+    <a:masterClrMapping/>
+  </p:clrMapOvr>
+  <mc:AlternateContent xmlns:mc="http://schemas.openxmlformats.org/markup-compatibility/2006" xmlns:p14="http://schemas.microsoft.com/office/powerpoint/2010/main">
+    <mc:Choice Requires="p14">
+      <p:transition spd="slow" p14:dur="2000" advClick="0" advTm="5000"/>
+    </mc:Choice>
+    <mc:Fallback xmlns="">
+      <p:transition spd="slow" advClick="0" advTm="5000"/>
+    </mc:Fallback>
+  </mc:AlternateContent>
+  <p:timing>
+    <p:tnLst>
+      <p:par>
+        <p:cTn id="1" dur="indefinite" restart="never" nodeType="tmRoot"/>
+      </p:par>
+    </p:tnLst>
+  </p:timing>
+</p:sld>
+</file>
+
+<file path=ppt/slides/slide30.xml><?xml version="1.0" encoding="utf-8"?>
 <p:sld xmlns:a="http://schemas.openxmlformats.org/drawingml/2006/main" xmlns:r="http://schemas.openxmlformats.org/officeDocument/2006/relationships" xmlns:p="http://schemas.openxmlformats.org/presentationml/2006/main">
   <p:cSld>
     <p:spTree>
@@ -22467,7 +23009,7 @@
             <a:fld id="{C014DD1E-5D91-48A3-AD6D-45FBA980D106}" type="slidenum">
               <a:rPr lang="en-US" smtClean="0"/>
               <a:pPr/>
-              <a:t>29</a:t>
+              <a:t>30</a:t>
             </a:fld>
             <a:endParaRPr lang="en-US" dirty="0"/>
           </a:p>
@@ -23669,123 +24211,7 @@
 </p:sld>
 </file>
 
-<file path=ppt/slides/slide3.xml><?xml version="1.0" encoding="utf-8"?>
-<p:sld xmlns:a="http://schemas.openxmlformats.org/drawingml/2006/main" xmlns:r="http://schemas.openxmlformats.org/officeDocument/2006/relationships" xmlns:p="http://schemas.openxmlformats.org/presentationml/2006/main">
-  <p:cSld>
-    <p:spTree>
-      <p:nvGrpSpPr>
-        <p:cNvPr id="1" name=""/>
-        <p:cNvGrpSpPr/>
-        <p:nvPr/>
-      </p:nvGrpSpPr>
-      <p:grpSpPr>
-        <a:xfrm>
-          <a:off x="0" y="0"/>
-          <a:ext cx="0" cy="0"/>
-          <a:chOff x="0" y="0"/>
-          <a:chExt cx="0" cy="0"/>
-        </a:xfrm>
-      </p:grpSpPr>
-      <p:sp>
-        <p:nvSpPr>
-          <p:cNvPr id="5" name="Title 4"/>
-          <p:cNvSpPr>
-            <a:spLocks noGrp="1"/>
-          </p:cNvSpPr>
-          <p:nvPr>
-            <p:ph type="title" sz="quarter" idx="10"/>
-          </p:nvPr>
-        </p:nvSpPr>
-        <p:spPr>
-          <a:xfrm>
-            <a:off x="615109" y="5135916"/>
-            <a:ext cx="10961783" cy="768084"/>
-          </a:xfrm>
-        </p:spPr>
-        <p:txBody>
-          <a:bodyPr/>
-          <a:lstStyle/>
-          <a:p>
-            <a:r>
-              <a:rPr lang="bg-BG" dirty="0" smtClean="0"/>
-              <a:t>Интересни факти за ͏</a:t>
-            </a:r>
-            <a:r>
-              <a:rPr lang="en-US" dirty="0" smtClean="0"/>
-              <a:t>Python</a:t>
-            </a:r>
-            <a:endParaRPr lang="en-US" dirty="0"/>
-          </a:p>
-        </p:txBody>
-      </p:sp>
-      <p:pic>
-        <p:nvPicPr>
-          <p:cNvPr id="1026" name="Picture 2" descr="undefined"/>
-          <p:cNvPicPr>
-            <a:picLocks noChangeAspect="1" noChangeArrowheads="1"/>
-          </p:cNvPicPr>
-          <p:nvPr/>
-        </p:nvPicPr>
-        <p:blipFill rotWithShape="1">
-          <a:blip r:embed="rId2" cstate="hqprint">
-            <a:extLst>
-              <a:ext uri="{28A0092B-C50C-407E-A947-70E740481C1C}">
-                <a14:useLocalDpi xmlns:a14="http://schemas.microsoft.com/office/drawing/2010/main" val="0"/>
-              </a:ext>
-            </a:extLst>
-          </a:blip>
-          <a:srcRect r="7878" b="14042"/>
-          <a:stretch/>
-        </p:blipFill>
-        <p:spPr bwMode="auto">
-          <a:xfrm>
-            <a:off x="5106000" y="1630172"/>
-            <a:ext cx="1980000" cy="2025000"/>
-          </a:xfrm>
-          <a:prstGeom prst="rect">
-            <a:avLst/>
-          </a:prstGeom>
-          <a:noFill/>
-          <a:extLst>
-            <a:ext uri="{909E8E84-426E-40DD-AFC4-6F175D3DCCD1}">
-              <a14:hiddenFill xmlns:a14="http://schemas.microsoft.com/office/drawing/2010/main">
-                <a:solidFill>
-                  <a:srgbClr val="FFFFFF"/>
-                </a:solidFill>
-              </a14:hiddenFill>
-            </a:ext>
-          </a:extLst>
-        </p:spPr>
-      </p:pic>
-    </p:spTree>
-    <p:extLst>
-      <p:ext uri="{BB962C8B-B14F-4D97-AF65-F5344CB8AC3E}">
-        <p14:creationId xmlns:p14="http://schemas.microsoft.com/office/powerpoint/2010/main" val="1084234799"/>
-      </p:ext>
-    </p:extLst>
-  </p:cSld>
-  <p:clrMapOvr>
-    <a:masterClrMapping/>
-  </p:clrMapOvr>
-  <mc:AlternateContent xmlns:mc="http://schemas.openxmlformats.org/markup-compatibility/2006" xmlns:p14="http://schemas.microsoft.com/office/powerpoint/2010/main">
-    <mc:Choice Requires="p14">
-      <p:transition spd="slow" p14:dur="2000" advClick="0" advTm="5000"/>
-    </mc:Choice>
-    <mc:Fallback xmlns="">
-      <p:transition spd="slow" advClick="0" advTm="5000"/>
-    </mc:Fallback>
-  </mc:AlternateContent>
-  <p:timing>
-    <p:tnLst>
-      <p:par>
-        <p:cTn id="1" dur="indefinite" restart="never" nodeType="tmRoot"/>
-      </p:par>
-    </p:tnLst>
-  </p:timing>
-</p:sld>
-</file>
-
-<file path=ppt/slides/slide30.xml><?xml version="1.0" encoding="utf-8"?>
+<file path=ppt/slides/slide31.xml><?xml version="1.0" encoding="utf-8"?>
 <p:sld xmlns:a="http://schemas.openxmlformats.org/drawingml/2006/main" xmlns:r="http://schemas.openxmlformats.org/officeDocument/2006/relationships" xmlns:p="http://schemas.openxmlformats.org/presentationml/2006/main">
   <p:cSld>
     <p:spTree>
@@ -23899,7 +24325,7 @@
                 <a:hlinkClick r:id="rId3">
                   <a:extLst>
                     <a:ext uri="{A12FA001-AC4F-418D-AE19-62706E023703}">
-                      <ahyp:hlinkClr xmlns="" xmlns:ahyp="http://schemas.microsoft.com/office/drawing/2018/hyperlinkcolor" val="tx"/>
+                      <ahyp:hlinkClr xmlns:ahyp="http://schemas.microsoft.com/office/drawing/2018/hyperlinkcolor" xmlns="" val="tx"/>
                     </a:ext>
                   </a:extLst>
                 </a:hlinkClick>
@@ -23982,7 +24408,7 @@
 </p:sld>
 </file>
 
-<file path=ppt/slides/slide31.xml><?xml version="1.0" encoding="utf-8"?>
+<file path=ppt/slides/slide32.xml><?xml version="1.0" encoding="utf-8"?>
 <p:sld xmlns:a="http://schemas.openxmlformats.org/drawingml/2006/main" xmlns:r="http://schemas.openxmlformats.org/officeDocument/2006/relationships" xmlns:p="http://schemas.openxmlformats.org/presentationml/2006/main" show="0">
   <p:cSld>
     <p:spTree>
@@ -24035,7 +24461,7 @@
             <a:fld id="{2BF067CD-8E6B-4360-9AA8-C5DF2A48A6D1}" type="slidenum">
               <a:rPr lang="en-US" smtClean="0"/>
               <a:pPr/>
-              <a:t>31</a:t>
+              <a:t>32</a:t>
             </a:fld>
             <a:endParaRPr lang="en-US" dirty="0"/>
           </a:p>
@@ -25061,8 +25487,45 @@
             </a:r>
             <a:r>
               <a:rPr lang="bg-BG" sz="3200" b="1" dirty="0" smtClean="0"/>
-              <a:t>онлайн среда за разработка</a:t>
-            </a:r>
+              <a:t>среда</a:t>
+            </a:r>
+            <a:r>
+              <a:rPr lang="bg-BG" sz="3200" b="1" dirty="0" smtClean="0"/>
+              <a:t>та</a:t>
+            </a:r>
+            <a:r>
+              <a:rPr lang="bg-BG" sz="3200" b="1" dirty="0" smtClean="0"/>
+              <a:t> </a:t>
+            </a:r>
+            <a:r>
+              <a:rPr lang="bg-BG" sz="3200" b="1" dirty="0" smtClean="0"/>
+              <a:t>за </a:t>
+            </a:r>
+            <a:r>
+              <a:rPr lang="bg-BG" sz="3200" b="1" dirty="0" smtClean="0"/>
+              <a:t>разработка </a:t>
+            </a:r>
+            <a:r>
+              <a:rPr lang="en-US" sz="3200" dirty="0" smtClean="0"/>
+              <a:t>–</a:t>
+            </a:r>
+            <a:r>
+              <a:rPr lang="en-US" sz="3200" dirty="0"/>
+              <a:t> </a:t>
+            </a:r>
+            <a:r>
+              <a:rPr lang="en-US" sz="3200" b="1" dirty="0" smtClean="0">
+                <a:solidFill>
+                  <a:schemeClr val="bg1"/>
+                </a:solidFill>
+              </a:rPr>
+              <a:t>Thonny</a:t>
+            </a:r>
+            <a:endParaRPr lang="bg-BG" sz="3200" b="1" dirty="0" smtClean="0">
+              <a:solidFill>
+                <a:schemeClr val="bg1"/>
+              </a:solidFill>
+            </a:endParaRPr>
           </a:p>
           <a:p>
             <a:r>
@@ -25075,7 +25538,19 @@
             </a:r>
             <a:r>
               <a:rPr lang="bg-BG" sz="3200" b="1" dirty="0" smtClean="0"/>
-              <a:t>онлайн </a:t>
+              <a:t>сваляне </a:t>
+            </a:r>
+            <a:r>
+              <a:rPr lang="bg-BG" sz="3200" dirty="0" smtClean="0"/>
+              <a:t>на</a:t>
+            </a:r>
+            <a:r>
+              <a:rPr lang="en-US" sz="3200" b="1" dirty="0" smtClean="0"/>
+              <a:t> Thonny</a:t>
+            </a:r>
+            <a:r>
+              <a:rPr lang="bg-BG" sz="3200" b="1" dirty="0" smtClean="0"/>
+              <a:t> </a:t>
             </a:r>
             <a:r>
               <a:rPr lang="en-US" sz="3200" b="1" dirty="0" smtClean="0"/>
@@ -25086,16 +25561,10 @@
               <a:t>– </a:t>
             </a:r>
             <a:r>
-              <a:rPr lang="en-US" sz="3200" dirty="0">
-                <a:hlinkClick r:id="rId2"/>
-              </a:rPr>
-              <a:t>https://www.online-python.com</a:t>
-            </a:r>
-            <a:r>
               <a:rPr lang="en-US" sz="3200" dirty="0" smtClean="0">
                 <a:hlinkClick r:id="rId2"/>
               </a:rPr>
-              <a:t>/</a:t>
+              <a:t>https://thonny.org</a:t>
             </a:r>
             <a:endParaRPr lang="bg-BG" sz="3200" dirty="0" smtClean="0"/>
           </a:p>
@@ -25132,7 +25601,7 @@
       </p:sp>
       <p:pic>
         <p:nvPicPr>
-          <p:cNvPr id="7" name="Picture 6"/>
+          <p:cNvPr id="2" name="Picture 1"/>
           <p:cNvPicPr>
             <a:picLocks noChangeAspect="1"/>
           </p:cNvPicPr>
@@ -25146,8 +25615,8 @@
         </p:blipFill>
         <p:spPr>
           <a:xfrm>
-            <a:off x="2836950" y="3179187"/>
-            <a:ext cx="6525000" cy="3534375"/>
+            <a:off x="3794925" y="3187761"/>
+            <a:ext cx="4609050" cy="3533605"/>
           </a:xfrm>
           <a:prstGeom prst="rect">
             <a:avLst/>
@@ -25262,7 +25731,7 @@
                                           </p:stCondLst>
                                         </p:cTn>
                                         <p:tgtEl>
-                                          <p:spTgt spid="7"/>
+                                          <p:spTgt spid="2"/>
                                         </p:tgtEl>
                                         <p:attrNameLst>
                                           <p:attrName>style.visibility</p:attrName>
@@ -25323,6 +25792,30 @@
           <a:chExt cx="0" cy="0"/>
         </a:xfrm>
       </p:grpSpPr>
+      <p:pic>
+        <p:nvPicPr>
+          <p:cNvPr id="16" name="Picture 15"/>
+          <p:cNvPicPr>
+            <a:picLocks noChangeAspect="1"/>
+          </p:cNvPicPr>
+          <p:nvPr/>
+        </p:nvPicPr>
+        <p:blipFill>
+          <a:blip r:embed="rId2"/>
+          <a:stretch>
+            <a:fillRect/>
+          </a:stretch>
+        </p:blipFill>
+        <p:spPr>
+          <a:xfrm>
+            <a:off x="4831484" y="1359000"/>
+            <a:ext cx="6573167" cy="5039428"/>
+          </a:xfrm>
+          <a:prstGeom prst="rect">
+            <a:avLst/>
+          </a:prstGeom>
+        </p:spPr>
+      </p:pic>
       <p:sp>
         <p:nvSpPr>
           <p:cNvPr id="2" name="Slide Number Placeholder 1"/>
@@ -25371,10 +25864,6 @@
               <a:t> </a:t>
             </a:r>
             <a:r>
-              <a:rPr lang="bg-BG" dirty="0" smtClean="0"/>
-              <a:t>онлайн </a:t>
-            </a:r>
-            <a:r>
               <a:rPr lang="en-US" dirty="0" smtClean="0"/>
               <a:t>IDE</a:t>
             </a:r>
@@ -25382,56 +25871,33 @@
               <a:rPr lang="bg-BG" dirty="0" smtClean="0"/>
               <a:t> </a:t>
             </a:r>
+            <a:r>
+              <a:rPr lang="en-US" dirty="0" smtClean="0"/>
+              <a:t>Thonny</a:t>
+            </a:r>
+            <a:r>
+              <a:rPr lang="bg-BG" dirty="0" smtClean="0"/>
+              <a:t> (1)</a:t>
+            </a:r>
             <a:endParaRPr lang="en-US" dirty="0"/>
           </a:p>
         </p:txBody>
       </p:sp>
-      <p:pic>
-        <p:nvPicPr>
-          <p:cNvPr id="5" name="Picture 4"/>
-          <p:cNvPicPr>
-            <a:picLocks noChangeAspect="1"/>
-          </p:cNvPicPr>
-          <p:nvPr/>
-        </p:nvPicPr>
-        <p:blipFill>
-          <a:blip r:embed="rId2"/>
-          <a:stretch>
-            <a:fillRect/>
-          </a:stretch>
-        </p:blipFill>
-        <p:spPr>
-          <a:xfrm>
-            <a:off x="1123500" y="1237125"/>
-            <a:ext cx="9945000" cy="5386875"/>
-          </a:xfrm>
-          <a:prstGeom prst="rect">
-            <a:avLst/>
-          </a:prstGeom>
-          <a:ln>
-            <a:solidFill>
-              <a:schemeClr val="bg2">
-                <a:lumMod val="75000"/>
-              </a:schemeClr>
-            </a:solidFill>
-          </a:ln>
-        </p:spPr>
-      </p:pic>
       <p:sp>
         <p:nvSpPr>
-          <p:cNvPr id="6" name="Rounded Rectangular Callout 5"/>
+          <p:cNvPr id="13" name="Rounded Rectangular Callout 12"/>
           <p:cNvSpPr/>
           <p:nvPr/>
         </p:nvSpPr>
         <p:spPr bwMode="auto">
           <a:xfrm>
-            <a:off x="8166000" y="1449000"/>
-            <a:ext cx="3766312" cy="1170000"/>
+            <a:off x="867887" y="1479388"/>
+            <a:ext cx="3513244" cy="638084"/>
           </a:xfrm>
           <a:prstGeom prst="wedgeRoundRectCallout">
             <a:avLst>
-              <a:gd name="adj1" fmla="val -77549"/>
-              <a:gd name="adj2" fmla="val 84481"/>
+              <a:gd name="adj1" fmla="val 63756"/>
+              <a:gd name="adj2" fmla="val 29660"/>
               <a:gd name="adj3" fmla="val 16667"/>
             </a:avLst>
           </a:prstGeom>
@@ -25489,62 +25955,11 @@
                   </a:outerShdw>
                 </a:effectLst>
               </a:rPr>
-              <a:t>Тук е полето, където</a:t>
-            </a:r>
-            <a:r>
-              <a:rPr lang="en-US" sz="2800" b="1" dirty="0" smtClean="0">
-                <a:solidFill>
-                  <a:srgbClr val="FFFFFF"/>
-                </a:solidFill>
-                <a:effectLst>
-                  <a:outerShdw blurRad="38100" dist="38100" dir="2700000" algn="tl">
-                    <a:srgbClr val="000000">
-                      <a:alpha val="43137"/>
-                    </a:srgbClr>
-                  </a:outerShdw>
-                </a:effectLst>
-              </a:rPr>
-              <a:t> </a:t>
-            </a:r>
-            <a:r>
-              <a:rPr lang="bg-BG" sz="2800" b="1" dirty="0" smtClean="0">
-                <a:solidFill>
-                  <a:srgbClr val="FFFFFF"/>
-                </a:solidFill>
-                <a:effectLst>
-                  <a:outerShdw blurRad="38100" dist="38100" dir="2700000" algn="tl">
-                    <a:srgbClr val="000000">
-                      <a:alpha val="43137"/>
-                    </a:srgbClr>
-                  </a:outerShdw>
-                </a:effectLst>
-              </a:rPr>
-              <a:t>ще пишем нашия </a:t>
-            </a:r>
-            <a:r>
-              <a:rPr lang="bg-BG" sz="2800" b="1" dirty="0" smtClean="0">
-                <a:solidFill>
-                  <a:schemeClr val="bg1">
-                    <a:lumMod val="60000"/>
-                    <a:lumOff val="40000"/>
-                  </a:schemeClr>
-                </a:solidFill>
-                <a:effectLst>
-                  <a:outerShdw blurRad="38100" dist="38100" dir="2700000" algn="tl">
-                    <a:srgbClr val="000000">
-                      <a:alpha val="43137"/>
-                    </a:srgbClr>
-                  </a:outerShdw>
-                </a:effectLst>
-              </a:rPr>
-              <a:t>код</a:t>
+              <a:t>Лента с инструменти</a:t>
             </a:r>
             <a:endParaRPr lang="en-US" sz="2800" b="1" dirty="0">
               <a:solidFill>
-                <a:schemeClr val="bg1">
-                  <a:lumMod val="60000"/>
-                  <a:lumOff val="40000"/>
-                </a:schemeClr>
+                <a:srgbClr val="FFFFFF"/>
               </a:solidFill>
               <a:effectLst>
                 <a:outerShdw blurRad="38100" dist="38100" dir="2700000" algn="tl">
@@ -25559,19 +25974,19 @@
       </p:sp>
       <p:sp>
         <p:nvSpPr>
-          <p:cNvPr id="7" name="Rounded Rectangular Callout 6"/>
+          <p:cNvPr id="6" name="Rounded Rectangular Callout 5"/>
           <p:cNvSpPr/>
           <p:nvPr/>
         </p:nvSpPr>
         <p:spPr bwMode="auto">
           <a:xfrm>
-            <a:off x="6866019" y="5087062"/>
-            <a:ext cx="5085718" cy="1568438"/>
+            <a:off x="614819" y="2439000"/>
+            <a:ext cx="3766312" cy="1170000"/>
           </a:xfrm>
           <a:prstGeom prst="wedgeRoundRectCallout">
             <a:avLst>
-              <a:gd name="adj1" fmla="val -71555"/>
-              <a:gd name="adj2" fmla="val -33333"/>
+              <a:gd name="adj1" fmla="val 79249"/>
+              <a:gd name="adj2" fmla="val 12840"/>
               <a:gd name="adj3" fmla="val 16667"/>
             </a:avLst>
           </a:prstGeom>
@@ -25629,15 +26044,12 @@
                   </a:outerShdw>
                 </a:effectLst>
               </a:rPr>
-              <a:t>Това е </a:t>
-            </a:r>
-            <a:r>
-              <a:rPr lang="bg-BG" sz="2800" b="1" dirty="0" smtClean="0">
-                <a:solidFill>
-                  <a:schemeClr val="bg1">
-                    <a:lumMod val="60000"/>
-                    <a:lumOff val="40000"/>
-                  </a:schemeClr>
+              <a:t>Тук е полето, където</a:t>
+            </a:r>
+            <a:r>
+              <a:rPr lang="en-US" sz="2800" b="1" dirty="0" smtClean="0">
+                <a:solidFill>
+                  <a:srgbClr val="FFFFFF"/>
                 </a:solidFill>
                 <a:effectLst>
                   <a:outerShdw blurRad="38100" dist="38100" dir="2700000" algn="tl">
@@ -25647,10 +26059,10 @@
                   </a:outerShdw>
                 </a:effectLst>
               </a:rPr>
-              <a:t>конзолата</a:t>
-            </a:r>
-            <a:r>
-              <a:rPr lang="en-US" sz="2800" b="1" dirty="0" smtClean="0">
+              <a:t> </a:t>
+            </a:r>
+            <a:r>
+              <a:rPr lang="bg-BG" sz="2800" b="1" dirty="0" smtClean="0">
                 <a:solidFill>
                   <a:srgbClr val="FFFFFF"/>
                 </a:solidFill>
@@ -25662,12 +26074,15 @@
                   </a:outerShdw>
                 </a:effectLst>
               </a:rPr>
-              <a:t>, </a:t>
+              <a:t>ще пишем нашия </a:t>
             </a:r>
             <a:r>
               <a:rPr lang="bg-BG" sz="2800" b="1" dirty="0" smtClean="0">
                 <a:solidFill>
-                  <a:srgbClr val="FFFFFF"/>
+                  <a:schemeClr val="bg1">
+                    <a:lumMod val="60000"/>
+                    <a:lumOff val="40000"/>
+                  </a:schemeClr>
                 </a:solidFill>
                 <a:effectLst>
                   <a:outerShdw blurRad="38100" dist="38100" dir="2700000" algn="tl">
@@ -25677,11 +26092,270 @@
                   </a:outerShdw>
                 </a:effectLst>
               </a:rPr>
-              <a:t>на която ще се отпечатва нашият резултат от написаната програма</a:t>
+              <a:t>код</a:t>
+            </a:r>
+            <a:endParaRPr lang="en-US" sz="2800" b="1" dirty="0">
+              <a:solidFill>
+                <a:schemeClr val="bg1">
+                  <a:lumMod val="60000"/>
+                  <a:lumOff val="40000"/>
+                </a:schemeClr>
+              </a:solidFill>
+              <a:effectLst>
+                <a:outerShdw blurRad="38100" dist="38100" dir="2700000" algn="tl">
+                  <a:srgbClr val="000000">
+                    <a:alpha val="43137"/>
+                  </a:srgbClr>
+                </a:outerShdw>
+              </a:effectLst>
+            </a:endParaRPr>
+          </a:p>
+        </p:txBody>
+      </p:sp>
+      <p:sp>
+        <p:nvSpPr>
+          <p:cNvPr id="7" name="Rounded Rectangular Callout 6"/>
+          <p:cNvSpPr/>
+          <p:nvPr/>
+        </p:nvSpPr>
+        <p:spPr bwMode="auto">
+          <a:xfrm>
+            <a:off x="257270" y="4301921"/>
+            <a:ext cx="4060594" cy="2353579"/>
+          </a:xfrm>
+          <a:prstGeom prst="wedgeRoundRectCallout">
+            <a:avLst>
+              <a:gd name="adj1" fmla="val 66525"/>
+              <a:gd name="adj2" fmla="val -5922"/>
+              <a:gd name="adj3" fmla="val 16667"/>
+            </a:avLst>
+          </a:prstGeom>
+          <a:solidFill>
+            <a:schemeClr val="dk2">
+              <a:alpha val="80000"/>
+            </a:schemeClr>
+          </a:solidFill>
+          <a:ln w="19050">
+            <a:solidFill>
+              <a:schemeClr val="tx1">
+                <a:lumMod val="75000"/>
+                <a:alpha val="80000"/>
+              </a:schemeClr>
+            </a:solidFill>
+          </a:ln>
+          <a:effectLst/>
+        </p:spPr>
+        <p:style>
+          <a:lnRef idx="2">
+            <a:schemeClr val="accent1">
+              <a:shade val="50000"/>
+            </a:schemeClr>
+          </a:lnRef>
+          <a:fillRef idx="1001">
+            <a:schemeClr val="dk2"/>
+          </a:fillRef>
+          <a:effectRef idx="0">
+            <a:schemeClr val="accent1"/>
+          </a:effectRef>
+          <a:fontRef idx="minor">
+            <a:schemeClr val="lt1"/>
+          </a:fontRef>
+        </p:style>
+        <p:txBody>
+          <a:bodyPr rot="0" spcFirstLastPara="0" vertOverflow="overflow" horzOverflow="overflow" vert="horz" wrap="square" lIns="91440" tIns="45720" rIns="91440" bIns="45720" numCol="1" spcCol="0" rtlCol="0" fromWordArt="0" anchor="ctr" anchorCtr="0" forceAA="0" compatLnSpc="1">
+            <a:prstTxWarp prst="textNoShape">
+              <a:avLst/>
+            </a:prstTxWarp>
+            <a:noAutofit/>
+          </a:bodyPr>
+          <a:lstStyle/>
+          <a:p>
+            <a:pPr algn="ctr"/>
+            <a:r>
+              <a:rPr lang="bg-BG" sz="2800" b="1" dirty="0" smtClean="0">
+                <a:solidFill>
+                  <a:srgbClr val="FFFFFF"/>
+                </a:solidFill>
+                <a:effectLst>
+                  <a:outerShdw blurRad="38100" dist="38100" dir="2700000" algn="tl">
+                    <a:srgbClr val="000000">
+                      <a:alpha val="43137"/>
+                    </a:srgbClr>
+                  </a:outerShdw>
+                </a:effectLst>
+              </a:rPr>
+              <a:t>Това е </a:t>
+            </a:r>
+            <a:r>
+              <a:rPr lang="bg-BG" sz="2800" b="1" dirty="0" smtClean="0">
+                <a:solidFill>
+                  <a:schemeClr val="bg1">
+                    <a:lumMod val="60000"/>
+                    <a:lumOff val="40000"/>
+                  </a:schemeClr>
+                </a:solidFill>
+                <a:effectLst>
+                  <a:outerShdw blurRad="38100" dist="38100" dir="2700000" algn="tl">
+                    <a:srgbClr val="000000">
+                      <a:alpha val="43137"/>
+                    </a:srgbClr>
+                  </a:outerShdw>
+                </a:effectLst>
+              </a:rPr>
+              <a:t>конзолата</a:t>
+            </a:r>
+            <a:r>
+              <a:rPr lang="en-US" sz="2800" b="1" dirty="0" smtClean="0">
+                <a:solidFill>
+                  <a:srgbClr val="FFFFFF"/>
+                </a:solidFill>
+                <a:effectLst>
+                  <a:outerShdw blurRad="38100" dist="38100" dir="2700000" algn="tl">
+                    <a:srgbClr val="000000">
+                      <a:alpha val="43137"/>
+                    </a:srgbClr>
+                  </a:outerShdw>
+                </a:effectLst>
+              </a:rPr>
+              <a:t>, </a:t>
+            </a:r>
+            <a:r>
+              <a:rPr lang="bg-BG" sz="2800" b="1" dirty="0" smtClean="0">
+                <a:solidFill>
+                  <a:srgbClr val="FFFFFF"/>
+                </a:solidFill>
+                <a:effectLst>
+                  <a:outerShdw blurRad="38100" dist="38100" dir="2700000" algn="tl">
+                    <a:srgbClr val="000000">
+                      <a:alpha val="43137"/>
+                    </a:srgbClr>
+                  </a:outerShdw>
+                </a:effectLst>
+              </a:rPr>
+              <a:t>на която ще </a:t>
+            </a:r>
+            <a:r>
+              <a:rPr lang="bg-BG" sz="2800" b="1" dirty="0" smtClean="0">
+                <a:solidFill>
+                  <a:srgbClr val="FFFFFF"/>
+                </a:solidFill>
+                <a:effectLst>
+                  <a:outerShdw blurRad="38100" dist="38100" dir="2700000" algn="tl">
+                    <a:srgbClr val="000000">
+                      <a:alpha val="43137"/>
+                    </a:srgbClr>
+                  </a:outerShdw>
+                </a:effectLst>
+              </a:rPr>
+              <a:t>въвеждаме и отпечатваме нашия </a:t>
+            </a:r>
+            <a:r>
+              <a:rPr lang="bg-BG" sz="2800" b="1" dirty="0" smtClean="0">
+                <a:solidFill>
+                  <a:srgbClr val="FFFFFF"/>
+                </a:solidFill>
+                <a:effectLst>
+                  <a:outerShdw blurRad="38100" dist="38100" dir="2700000" algn="tl">
+                    <a:srgbClr val="000000">
+                      <a:alpha val="43137"/>
+                    </a:srgbClr>
+                  </a:outerShdw>
+                </a:effectLst>
+              </a:rPr>
+              <a:t>резултат от написаната програма</a:t>
             </a:r>
             <a:endParaRPr lang="en-US" sz="2800" b="1" dirty="0">
               <a:solidFill>
                 <a:srgbClr val="FFFFFF"/>
+              </a:solidFill>
+              <a:effectLst>
+                <a:outerShdw blurRad="38100" dist="38100" dir="2700000" algn="tl">
+                  <a:srgbClr val="000000">
+                    <a:alpha val="43137"/>
+                  </a:srgbClr>
+                </a:outerShdw>
+              </a:effectLst>
+            </a:endParaRPr>
+          </a:p>
+        </p:txBody>
+      </p:sp>
+      <p:sp>
+        <p:nvSpPr>
+          <p:cNvPr id="14" name="Rounded Rectangular Callout 13"/>
+          <p:cNvSpPr/>
+          <p:nvPr/>
+        </p:nvSpPr>
+        <p:spPr bwMode="auto">
+          <a:xfrm>
+            <a:off x="5646000" y="3744000"/>
+            <a:ext cx="3960000" cy="623700"/>
+          </a:xfrm>
+          <a:prstGeom prst="wedgeRoundRectCallout">
+            <a:avLst>
+              <a:gd name="adj1" fmla="val 60387"/>
+              <a:gd name="adj2" fmla="val -94824"/>
+              <a:gd name="adj3" fmla="val 16667"/>
+            </a:avLst>
+          </a:prstGeom>
+          <a:solidFill>
+            <a:schemeClr val="dk2">
+              <a:alpha val="80000"/>
+            </a:schemeClr>
+          </a:solidFill>
+          <a:ln w="19050">
+            <a:solidFill>
+              <a:schemeClr val="tx1">
+                <a:lumMod val="75000"/>
+                <a:alpha val="80000"/>
+              </a:schemeClr>
+            </a:solidFill>
+          </a:ln>
+          <a:effectLst/>
+        </p:spPr>
+        <p:style>
+          <a:lnRef idx="2">
+            <a:schemeClr val="accent1">
+              <a:shade val="50000"/>
+            </a:schemeClr>
+          </a:lnRef>
+          <a:fillRef idx="1001">
+            <a:schemeClr val="dk2"/>
+          </a:fillRef>
+          <a:effectRef idx="0">
+            <a:schemeClr val="accent1"/>
+          </a:effectRef>
+          <a:fontRef idx="minor">
+            <a:schemeClr val="lt1"/>
+          </a:fontRef>
+        </p:style>
+        <p:txBody>
+          <a:bodyPr rot="0" spcFirstLastPara="0" vertOverflow="overflow" horzOverflow="overflow" vert="horz" wrap="square" lIns="91440" tIns="45720" rIns="91440" bIns="45720" numCol="1" spcCol="0" rtlCol="0" fromWordArt="0" anchor="ctr" anchorCtr="0" forceAA="0" compatLnSpc="1">
+            <a:prstTxWarp prst="textNoShape">
+              <a:avLst/>
+            </a:prstTxWarp>
+            <a:noAutofit/>
+          </a:bodyPr>
+          <a:lstStyle/>
+          <a:p>
+            <a:pPr algn="ctr"/>
+            <a:r>
+              <a:rPr lang="bg-BG" sz="2800" b="1" dirty="0" smtClean="0">
+                <a:solidFill>
+                  <a:schemeClr val="bg2"/>
+                </a:solidFill>
+                <a:effectLst>
+                  <a:outerShdw blurRad="38100" dist="38100" dir="2700000" algn="tl">
+                    <a:srgbClr val="000000">
+                      <a:alpha val="43137"/>
+                    </a:srgbClr>
+                  </a:outerShdw>
+                </a:effectLst>
+              </a:rPr>
+              <a:t>Помощник при грешки</a:t>
+            </a:r>
+            <a:endParaRPr lang="en-US" sz="2800" b="1" dirty="0">
+              <a:solidFill>
+                <a:schemeClr val="bg2"/>
               </a:solidFill>
               <a:effectLst>
                 <a:outerShdw blurRad="38100" dist="38100" dir="2700000" algn="tl">
@@ -25746,7 +26420,7 @@
                                           </p:stCondLst>
                                         </p:cTn>
                                         <p:tgtEl>
-                                          <p:spTgt spid="6"/>
+                                          <p:spTgt spid="13"/>
                                         </p:tgtEl>
                                         <p:attrNameLst>
                                           <p:attrName>style.visibility</p:attrName>
@@ -25791,7 +26465,97 @@
                                           </p:stCondLst>
                                         </p:cTn>
                                         <p:tgtEl>
+                                          <p:spTgt spid="6"/>
+                                        </p:tgtEl>
+                                        <p:attrNameLst>
+                                          <p:attrName>style.visibility</p:attrName>
+                                        </p:attrNameLst>
+                                      </p:cBhvr>
+                                      <p:to>
+                                        <p:strVal val="visible"/>
+                                      </p:to>
+                                    </p:set>
+                                  </p:childTnLst>
+                                </p:cTn>
+                              </p:par>
+                            </p:childTnLst>
+                          </p:cTn>
+                        </p:par>
+                      </p:childTnLst>
+                    </p:cTn>
+                  </p:par>
+                  <p:par>
+                    <p:cTn id="11" fill="hold">
+                      <p:stCondLst>
+                        <p:cond delay="indefinite"/>
+                      </p:stCondLst>
+                      <p:childTnLst>
+                        <p:par>
+                          <p:cTn id="12" fill="hold">
+                            <p:stCondLst>
+                              <p:cond delay="0"/>
+                            </p:stCondLst>
+                            <p:childTnLst>
+                              <p:par>
+                                <p:cTn id="13" presetID="1" presetClass="entr" presetSubtype="0" fill="hold" grpId="0" nodeType="clickEffect">
+                                  <p:stCondLst>
+                                    <p:cond delay="0"/>
+                                  </p:stCondLst>
+                                  <p:childTnLst>
+                                    <p:set>
+                                      <p:cBhvr>
+                                        <p:cTn id="14" dur="1" fill="hold">
+                                          <p:stCondLst>
+                                            <p:cond delay="0"/>
+                                          </p:stCondLst>
+                                        </p:cTn>
+                                        <p:tgtEl>
                                           <p:spTgt spid="7"/>
+                                        </p:tgtEl>
+                                        <p:attrNameLst>
+                                          <p:attrName>style.visibility</p:attrName>
+                                        </p:attrNameLst>
+                                      </p:cBhvr>
+                                      <p:to>
+                                        <p:strVal val="visible"/>
+                                      </p:to>
+                                    </p:set>
+                                  </p:childTnLst>
+                                </p:cTn>
+                              </p:par>
+                            </p:childTnLst>
+                          </p:cTn>
+                        </p:par>
+                      </p:childTnLst>
+                    </p:cTn>
+                  </p:par>
+                  <p:par>
+                    <p:cTn id="15" fill="hold">
+                      <p:stCondLst>
+                        <p:cond delay="indefinite"/>
+                      </p:stCondLst>
+                      <p:childTnLst>
+                        <p:par>
+                          <p:cTn id="16" fill="hold">
+                            <p:stCondLst>
+                              <p:cond delay="0"/>
+                            </p:stCondLst>
+                            <p:childTnLst>
+                              <p:par>
+                                <p:cTn id="17" presetID="1" presetClass="entr" presetSubtype="0" fill="hold" grpId="0" nodeType="clickEffect">
+                                  <p:stCondLst>
+                                    <p:cond delay="0"/>
+                                  </p:stCondLst>
+                                  <p:childTnLst>
+                                    <p:set>
+                                      <p:cBhvr>
+                                        <p:cTn id="18" dur="1" fill="hold">
+                                          <p:stCondLst>
+                                            <p:cond delay="0"/>
+                                          </p:stCondLst>
+                                        </p:cTn>
+                                        <p:tgtEl>
+                                          <p:spTgt spid="14"/>
                                         </p:tgtEl>
                                         <p:attrNameLst>
                                           <p:attrName>style.visibility</p:attrName>
@@ -25832,8 +26596,10 @@
       </p:par>
     </p:tnLst>
     <p:bldLst>
+      <p:bldP spid="13" grpId="0" animBg="1"/>
       <p:bldP spid="6" grpId="0" animBg="1"/>
       <p:bldP spid="7" grpId="0" animBg="1"/>
+      <p:bldP spid="14" grpId="0" animBg="1"/>
     </p:bldLst>
   </p:timing>
 </p:sld>
@@ -25856,6 +26622,37 @@
           <a:chExt cx="0" cy="0"/>
         </a:xfrm>
       </p:grpSpPr>
+      <p:pic>
+        <p:nvPicPr>
+          <p:cNvPr id="8" name="Picture 7"/>
+          <p:cNvPicPr>
+            <a:picLocks noChangeAspect="1"/>
+          </p:cNvPicPr>
+          <p:nvPr/>
+        </p:nvPicPr>
+        <p:blipFill>
+          <a:blip r:embed="rId2"/>
+          <a:stretch>
+            <a:fillRect/>
+          </a:stretch>
+        </p:blipFill>
+        <p:spPr>
+          <a:xfrm>
+            <a:off x="3501615" y="3301709"/>
+            <a:ext cx="5926170" cy="683789"/>
+          </a:xfrm>
+          <a:prstGeom prst="rect">
+            <a:avLst/>
+          </a:prstGeom>
+          <a:ln>
+            <a:solidFill>
+              <a:schemeClr val="bg2">
+                <a:lumMod val="75000"/>
+              </a:schemeClr>
+            </a:solidFill>
+          </a:ln>
+        </p:spPr>
+      </p:pic>
       <p:sp>
         <p:nvSpPr>
           <p:cNvPr id="2" name="Slide Number Placeholder 1"/>
@@ -25875,6 +26672,1072 @@
               <a:rPr lang="en-US" noProof="0" smtClean="0"/>
               <a:pPr/>
               <a:t>8</a:t>
+            </a:fld>
+            <a:endParaRPr lang="en-US" noProof="0" dirty="0"/>
+          </a:p>
+        </p:txBody>
+      </p:sp>
+      <p:sp>
+        <p:nvSpPr>
+          <p:cNvPr id="4" name="Title 3"/>
+          <p:cNvSpPr>
+            <a:spLocks noGrp="1"/>
+          </p:cNvSpPr>
+          <p:nvPr>
+            <p:ph type="title"/>
+          </p:nvPr>
+        </p:nvSpPr>
+        <p:spPr/>
+        <p:txBody>
+          <a:bodyPr/>
+          <a:lstStyle/>
+          <a:p>
+            <a:r>
+              <a:rPr lang="bg-BG" dirty="0" smtClean="0"/>
+              <a:t>Елементи на</a:t>
+            </a:r>
+            <a:r>
+              <a:rPr lang="en-US" dirty="0" smtClean="0"/>
+              <a:t> </a:t>
+            </a:r>
+            <a:r>
+              <a:rPr lang="en-US" dirty="0" smtClean="0"/>
+              <a:t>IDE</a:t>
+            </a:r>
+            <a:r>
+              <a:rPr lang="bg-BG" dirty="0" smtClean="0"/>
+              <a:t> </a:t>
+            </a:r>
+            <a:r>
+              <a:rPr lang="en-US" dirty="0" smtClean="0"/>
+              <a:t>Thonny</a:t>
+            </a:r>
+            <a:r>
+              <a:rPr lang="bg-BG" dirty="0" smtClean="0"/>
+              <a:t> (</a:t>
+            </a:r>
+            <a:r>
+              <a:rPr lang="en-US" dirty="0" smtClean="0"/>
+              <a:t>2</a:t>
+            </a:r>
+            <a:r>
+              <a:rPr lang="bg-BG" dirty="0" smtClean="0"/>
+              <a:t>)</a:t>
+            </a:r>
+            <a:endParaRPr lang="en-US" dirty="0"/>
+          </a:p>
+        </p:txBody>
+      </p:sp>
+      <p:sp>
+        <p:nvSpPr>
+          <p:cNvPr id="5" name="Rounded Rectangular Callout 4"/>
+          <p:cNvSpPr/>
+          <p:nvPr/>
+        </p:nvSpPr>
+        <p:spPr bwMode="auto">
+          <a:xfrm>
+            <a:off x="1281000" y="1965158"/>
+            <a:ext cx="2295000" cy="945000"/>
+          </a:xfrm>
+          <a:prstGeom prst="wedgeRoundRectCallout">
+            <a:avLst>
+              <a:gd name="adj1" fmla="val 48893"/>
+              <a:gd name="adj2" fmla="val 109873"/>
+              <a:gd name="adj3" fmla="val 16667"/>
+            </a:avLst>
+          </a:prstGeom>
+          <a:solidFill>
+            <a:schemeClr val="dk2">
+              <a:alpha val="80000"/>
+            </a:schemeClr>
+          </a:solidFill>
+          <a:ln w="19050">
+            <a:solidFill>
+              <a:schemeClr val="tx1">
+                <a:lumMod val="75000"/>
+                <a:alpha val="80000"/>
+              </a:schemeClr>
+            </a:solidFill>
+          </a:ln>
+          <a:effectLst/>
+        </p:spPr>
+        <p:style>
+          <a:lnRef idx="2">
+            <a:schemeClr val="accent1">
+              <a:shade val="50000"/>
+            </a:schemeClr>
+          </a:lnRef>
+          <a:fillRef idx="1001">
+            <a:schemeClr val="dk2"/>
+          </a:fillRef>
+          <a:effectRef idx="0">
+            <a:schemeClr val="accent1"/>
+          </a:effectRef>
+          <a:fontRef idx="minor">
+            <a:schemeClr val="lt1"/>
+          </a:fontRef>
+        </p:style>
+        <p:txBody>
+          <a:bodyPr rot="0" spcFirstLastPara="0" vertOverflow="overflow" horzOverflow="overflow" vert="horz" wrap="square" lIns="91440" tIns="45720" rIns="91440" bIns="45720" numCol="1" spcCol="0" rtlCol="0" fromWordArt="0" anchor="ctr" anchorCtr="0" forceAA="0" compatLnSpc="1">
+            <a:prstTxWarp prst="textNoShape">
+              <a:avLst/>
+            </a:prstTxWarp>
+            <a:noAutofit/>
+          </a:bodyPr>
+          <a:lstStyle/>
+          <a:p>
+            <a:pPr algn="ctr"/>
+            <a:r>
+              <a:rPr lang="bg-BG" sz="2800" b="1" dirty="0" smtClean="0">
+                <a:solidFill>
+                  <a:srgbClr val="FFFFFF"/>
+                </a:solidFill>
+                <a:effectLst>
+                  <a:outerShdw blurRad="38100" dist="38100" dir="2700000" algn="tl">
+                    <a:srgbClr val="000000">
+                      <a:alpha val="43137"/>
+                    </a:srgbClr>
+                  </a:outerShdw>
+                </a:effectLst>
+              </a:rPr>
+              <a:t>Отваряне на нов файл</a:t>
+            </a:r>
+            <a:endParaRPr lang="en-US" sz="2800" b="1" dirty="0">
+              <a:solidFill>
+                <a:srgbClr val="FFFFFF"/>
+              </a:solidFill>
+              <a:effectLst>
+                <a:outerShdw blurRad="38100" dist="38100" dir="2700000" algn="tl">
+                  <a:srgbClr val="000000">
+                    <a:alpha val="43137"/>
+                  </a:srgbClr>
+                </a:outerShdw>
+              </a:effectLst>
+            </a:endParaRPr>
+          </a:p>
+        </p:txBody>
+      </p:sp>
+      <p:sp>
+        <p:nvSpPr>
+          <p:cNvPr id="11" name="Rounded Rectangular Callout 10"/>
+          <p:cNvSpPr/>
+          <p:nvPr/>
+        </p:nvSpPr>
+        <p:spPr bwMode="auto">
+          <a:xfrm>
+            <a:off x="3801000" y="1484850"/>
+            <a:ext cx="3312600" cy="972600"/>
+          </a:xfrm>
+          <a:prstGeom prst="wedgeRoundRectCallout">
+            <a:avLst>
+              <a:gd name="adj1" fmla="val -33197"/>
+              <a:gd name="adj2" fmla="val 142805"/>
+              <a:gd name="adj3" fmla="val 16667"/>
+            </a:avLst>
+          </a:prstGeom>
+          <a:solidFill>
+            <a:schemeClr val="dk2">
+              <a:alpha val="80000"/>
+            </a:schemeClr>
+          </a:solidFill>
+          <a:ln w="19050">
+            <a:solidFill>
+              <a:schemeClr val="tx1">
+                <a:lumMod val="75000"/>
+                <a:alpha val="80000"/>
+              </a:schemeClr>
+            </a:solidFill>
+          </a:ln>
+          <a:effectLst/>
+        </p:spPr>
+        <p:style>
+          <a:lnRef idx="2">
+            <a:schemeClr val="accent1">
+              <a:shade val="50000"/>
+            </a:schemeClr>
+          </a:lnRef>
+          <a:fillRef idx="1001">
+            <a:schemeClr val="dk2"/>
+          </a:fillRef>
+          <a:effectRef idx="0">
+            <a:schemeClr val="accent1"/>
+          </a:effectRef>
+          <a:fontRef idx="minor">
+            <a:schemeClr val="lt1"/>
+          </a:fontRef>
+        </p:style>
+        <p:txBody>
+          <a:bodyPr rot="0" spcFirstLastPara="0" vertOverflow="overflow" horzOverflow="overflow" vert="horz" wrap="square" lIns="91440" tIns="45720" rIns="91440" bIns="45720" numCol="1" spcCol="0" rtlCol="0" fromWordArt="0" anchor="ctr" anchorCtr="0" forceAA="0" compatLnSpc="1">
+            <a:prstTxWarp prst="textNoShape">
+              <a:avLst/>
+            </a:prstTxWarp>
+            <a:noAutofit/>
+          </a:bodyPr>
+          <a:lstStyle/>
+          <a:p>
+            <a:pPr algn="ctr"/>
+            <a:r>
+              <a:rPr lang="bg-BG" sz="2800" b="1" dirty="0" smtClean="0">
+                <a:solidFill>
+                  <a:srgbClr val="FFFFFF"/>
+                </a:solidFill>
+                <a:effectLst>
+                  <a:outerShdw blurRad="38100" dist="38100" dir="2700000" algn="tl">
+                    <a:srgbClr val="000000">
+                      <a:alpha val="43137"/>
+                    </a:srgbClr>
+                  </a:outerShdw>
+                </a:effectLst>
+              </a:rPr>
+              <a:t>Отваряне на съществуващ файл</a:t>
+            </a:r>
+            <a:endParaRPr lang="en-US" sz="2800" b="1" dirty="0">
+              <a:solidFill>
+                <a:srgbClr val="FFFFFF"/>
+              </a:solidFill>
+              <a:effectLst>
+                <a:outerShdw blurRad="38100" dist="38100" dir="2700000" algn="tl">
+                  <a:srgbClr val="000000">
+                    <a:alpha val="43137"/>
+                  </a:srgbClr>
+                </a:outerShdw>
+              </a:effectLst>
+            </a:endParaRPr>
+          </a:p>
+        </p:txBody>
+      </p:sp>
+      <p:sp>
+        <p:nvSpPr>
+          <p:cNvPr id="12" name="Rounded Rectangular Callout 11"/>
+          <p:cNvSpPr/>
+          <p:nvPr/>
+        </p:nvSpPr>
+        <p:spPr bwMode="auto">
+          <a:xfrm>
+            <a:off x="4476000" y="4599000"/>
+            <a:ext cx="2765160" cy="972600"/>
+          </a:xfrm>
+          <a:prstGeom prst="wedgeRoundRectCallout">
+            <a:avLst>
+              <a:gd name="adj1" fmla="val -11937"/>
+              <a:gd name="adj2" fmla="val -117698"/>
+              <a:gd name="adj3" fmla="val 16667"/>
+            </a:avLst>
+          </a:prstGeom>
+          <a:solidFill>
+            <a:schemeClr val="dk2">
+              <a:alpha val="80000"/>
+            </a:schemeClr>
+          </a:solidFill>
+          <a:ln w="19050">
+            <a:solidFill>
+              <a:schemeClr val="tx1">
+                <a:lumMod val="75000"/>
+                <a:alpha val="80000"/>
+              </a:schemeClr>
+            </a:solidFill>
+          </a:ln>
+          <a:effectLst/>
+        </p:spPr>
+        <p:style>
+          <a:lnRef idx="2">
+            <a:schemeClr val="accent1">
+              <a:shade val="50000"/>
+            </a:schemeClr>
+          </a:lnRef>
+          <a:fillRef idx="1001">
+            <a:schemeClr val="dk2"/>
+          </a:fillRef>
+          <a:effectRef idx="0">
+            <a:schemeClr val="accent1"/>
+          </a:effectRef>
+          <a:fontRef idx="minor">
+            <a:schemeClr val="lt1"/>
+          </a:fontRef>
+        </p:style>
+        <p:txBody>
+          <a:bodyPr rot="0" spcFirstLastPara="0" vertOverflow="overflow" horzOverflow="overflow" vert="horz" wrap="square" lIns="91440" tIns="45720" rIns="91440" bIns="45720" numCol="1" spcCol="0" rtlCol="0" fromWordArt="0" anchor="ctr" anchorCtr="0" forceAA="0" compatLnSpc="1">
+            <a:prstTxWarp prst="textNoShape">
+              <a:avLst/>
+            </a:prstTxWarp>
+            <a:noAutofit/>
+          </a:bodyPr>
+          <a:lstStyle/>
+          <a:p>
+            <a:pPr algn="ctr"/>
+            <a:r>
+              <a:rPr lang="bg-BG" sz="2800" b="1" dirty="0" smtClean="0">
+                <a:solidFill>
+                  <a:srgbClr val="FFFFFF"/>
+                </a:solidFill>
+                <a:effectLst>
+                  <a:outerShdw blurRad="38100" dist="38100" dir="2700000" algn="tl">
+                    <a:srgbClr val="000000">
+                      <a:alpha val="43137"/>
+                    </a:srgbClr>
+                  </a:outerShdw>
+                </a:effectLst>
+              </a:rPr>
+              <a:t>Изпълнение на кода (</a:t>
+            </a:r>
+            <a:r>
+              <a:rPr lang="en-US" sz="2800" b="1" dirty="0" smtClean="0">
+                <a:solidFill>
+                  <a:schemeClr val="accent1">
+                    <a:lumMod val="60000"/>
+                    <a:lumOff val="40000"/>
+                  </a:schemeClr>
+                </a:solidFill>
+                <a:effectLst>
+                  <a:outerShdw blurRad="38100" dist="38100" dir="2700000" algn="tl">
+                    <a:srgbClr val="000000">
+                      <a:alpha val="43137"/>
+                    </a:srgbClr>
+                  </a:outerShdw>
+                </a:effectLst>
+              </a:rPr>
+              <a:t>Run</a:t>
+            </a:r>
+            <a:r>
+              <a:rPr lang="bg-BG" sz="2800" b="1" dirty="0" smtClean="0">
+                <a:solidFill>
+                  <a:srgbClr val="FFFFFF"/>
+                </a:solidFill>
+                <a:effectLst>
+                  <a:outerShdw blurRad="38100" dist="38100" dir="2700000" algn="tl">
+                    <a:srgbClr val="000000">
+                      <a:alpha val="43137"/>
+                    </a:srgbClr>
+                  </a:outerShdw>
+                </a:effectLst>
+              </a:rPr>
+              <a:t>)</a:t>
+            </a:r>
+            <a:endParaRPr lang="en-US" sz="2800" b="1" dirty="0">
+              <a:solidFill>
+                <a:srgbClr val="FFFFFF"/>
+              </a:solidFill>
+              <a:effectLst>
+                <a:outerShdw blurRad="38100" dist="38100" dir="2700000" algn="tl">
+                  <a:srgbClr val="000000">
+                    <a:alpha val="43137"/>
+                  </a:srgbClr>
+                </a:outerShdw>
+              </a:effectLst>
+            </a:endParaRPr>
+          </a:p>
+        </p:txBody>
+      </p:sp>
+      <p:sp>
+        <p:nvSpPr>
+          <p:cNvPr id="15" name="Rounded Rectangular Callout 14"/>
+          <p:cNvSpPr/>
+          <p:nvPr/>
+        </p:nvSpPr>
+        <p:spPr bwMode="auto">
+          <a:xfrm>
+            <a:off x="7438560" y="4224943"/>
+            <a:ext cx="3493687" cy="972600"/>
+          </a:xfrm>
+          <a:prstGeom prst="wedgeRoundRectCallout">
+            <a:avLst>
+              <a:gd name="adj1" fmla="val -83812"/>
+              <a:gd name="adj2" fmla="val -89297"/>
+              <a:gd name="adj3" fmla="val 16667"/>
+            </a:avLst>
+          </a:prstGeom>
+          <a:solidFill>
+            <a:schemeClr val="dk2">
+              <a:alpha val="80000"/>
+            </a:schemeClr>
+          </a:solidFill>
+          <a:ln w="19050">
+            <a:solidFill>
+              <a:schemeClr val="tx1">
+                <a:lumMod val="75000"/>
+                <a:alpha val="80000"/>
+              </a:schemeClr>
+            </a:solidFill>
+          </a:ln>
+          <a:effectLst/>
+        </p:spPr>
+        <p:style>
+          <a:lnRef idx="2">
+            <a:schemeClr val="accent1">
+              <a:shade val="50000"/>
+            </a:schemeClr>
+          </a:lnRef>
+          <a:fillRef idx="1001">
+            <a:schemeClr val="dk2"/>
+          </a:fillRef>
+          <a:effectRef idx="0">
+            <a:schemeClr val="accent1"/>
+          </a:effectRef>
+          <a:fontRef idx="minor">
+            <a:schemeClr val="lt1"/>
+          </a:fontRef>
+        </p:style>
+        <p:txBody>
+          <a:bodyPr rot="0" spcFirstLastPara="0" vertOverflow="overflow" horzOverflow="overflow" vert="horz" wrap="square" lIns="91440" tIns="45720" rIns="91440" bIns="45720" numCol="1" spcCol="0" rtlCol="0" fromWordArt="0" anchor="ctr" anchorCtr="0" forceAA="0" compatLnSpc="1">
+            <a:prstTxWarp prst="textNoShape">
+              <a:avLst/>
+            </a:prstTxWarp>
+            <a:noAutofit/>
+          </a:bodyPr>
+          <a:lstStyle/>
+          <a:p>
+            <a:pPr algn="ctr"/>
+            <a:r>
+              <a:rPr lang="bg-BG" sz="2800" b="1" dirty="0" smtClean="0">
+                <a:solidFill>
+                  <a:srgbClr val="FFFFFF"/>
+                </a:solidFill>
+                <a:effectLst>
+                  <a:outerShdw blurRad="38100" dist="38100" dir="2700000" algn="tl">
+                    <a:srgbClr val="000000">
+                      <a:alpha val="43137"/>
+                    </a:srgbClr>
+                  </a:outerShdw>
+                </a:effectLst>
+              </a:rPr>
+              <a:t>Проверка за грешки в кода </a:t>
+            </a:r>
+            <a:r>
+              <a:rPr lang="en-US" sz="2800" b="1" dirty="0" smtClean="0">
+                <a:solidFill>
+                  <a:srgbClr val="FFFFFF"/>
+                </a:solidFill>
+                <a:effectLst>
+                  <a:outerShdw blurRad="38100" dist="38100" dir="2700000" algn="tl">
+                    <a:srgbClr val="000000">
+                      <a:alpha val="43137"/>
+                    </a:srgbClr>
+                  </a:outerShdw>
+                </a:effectLst>
+              </a:rPr>
+              <a:t>(</a:t>
+            </a:r>
+            <a:r>
+              <a:rPr lang="en-US" sz="2800" b="1" dirty="0" smtClean="0">
+                <a:solidFill>
+                  <a:schemeClr val="accent1">
+                    <a:lumMod val="60000"/>
+                    <a:lumOff val="40000"/>
+                  </a:schemeClr>
+                </a:solidFill>
+                <a:effectLst>
+                  <a:outerShdw blurRad="38100" dist="38100" dir="2700000" algn="tl">
+                    <a:srgbClr val="000000">
+                      <a:alpha val="43137"/>
+                    </a:srgbClr>
+                  </a:outerShdw>
+                </a:effectLst>
+              </a:rPr>
+              <a:t>Debugger</a:t>
+            </a:r>
+            <a:r>
+              <a:rPr lang="en-US" sz="2800" b="1" dirty="0" smtClean="0">
+                <a:solidFill>
+                  <a:srgbClr val="FFFFFF"/>
+                </a:solidFill>
+                <a:effectLst>
+                  <a:outerShdw blurRad="38100" dist="38100" dir="2700000" algn="tl">
+                    <a:srgbClr val="000000">
+                      <a:alpha val="43137"/>
+                    </a:srgbClr>
+                  </a:outerShdw>
+                </a:effectLst>
+              </a:rPr>
+              <a:t>)</a:t>
+            </a:r>
+            <a:endParaRPr lang="en-US" sz="2800" b="1" dirty="0">
+              <a:solidFill>
+                <a:srgbClr val="FFFFFF"/>
+              </a:solidFill>
+              <a:effectLst>
+                <a:outerShdw blurRad="38100" dist="38100" dir="2700000" algn="tl">
+                  <a:srgbClr val="000000">
+                    <a:alpha val="43137"/>
+                  </a:srgbClr>
+                </a:outerShdw>
+              </a:effectLst>
+            </a:endParaRPr>
+          </a:p>
+        </p:txBody>
+      </p:sp>
+      <p:sp>
+        <p:nvSpPr>
+          <p:cNvPr id="17" name="Rounded Rectangular Callout 16"/>
+          <p:cNvSpPr/>
+          <p:nvPr/>
+        </p:nvSpPr>
+        <p:spPr bwMode="auto">
+          <a:xfrm>
+            <a:off x="7421160" y="1894713"/>
+            <a:ext cx="3849840" cy="972600"/>
+          </a:xfrm>
+          <a:prstGeom prst="wedgeRoundRectCallout">
+            <a:avLst>
+              <a:gd name="adj1" fmla="val -11431"/>
+              <a:gd name="adj2" fmla="val 97756"/>
+              <a:gd name="adj3" fmla="val 16667"/>
+            </a:avLst>
+          </a:prstGeom>
+          <a:solidFill>
+            <a:schemeClr val="dk2">
+              <a:alpha val="80000"/>
+            </a:schemeClr>
+          </a:solidFill>
+          <a:ln w="19050">
+            <a:solidFill>
+              <a:schemeClr val="tx1">
+                <a:lumMod val="75000"/>
+                <a:alpha val="80000"/>
+              </a:schemeClr>
+            </a:solidFill>
+          </a:ln>
+          <a:effectLst/>
+        </p:spPr>
+        <p:style>
+          <a:lnRef idx="2">
+            <a:schemeClr val="accent1">
+              <a:shade val="50000"/>
+            </a:schemeClr>
+          </a:lnRef>
+          <a:fillRef idx="1001">
+            <a:schemeClr val="dk2"/>
+          </a:fillRef>
+          <a:effectRef idx="0">
+            <a:schemeClr val="accent1"/>
+          </a:effectRef>
+          <a:fontRef idx="minor">
+            <a:schemeClr val="lt1"/>
+          </a:fontRef>
+        </p:style>
+        <p:txBody>
+          <a:bodyPr rot="0" spcFirstLastPara="0" vertOverflow="overflow" horzOverflow="overflow" vert="horz" wrap="square" lIns="91440" tIns="45720" rIns="91440" bIns="45720" numCol="1" spcCol="0" rtlCol="0" fromWordArt="0" anchor="ctr" anchorCtr="0" forceAA="0" compatLnSpc="1">
+            <a:prstTxWarp prst="textNoShape">
+              <a:avLst/>
+            </a:prstTxWarp>
+            <a:noAutofit/>
+          </a:bodyPr>
+          <a:lstStyle/>
+          <a:p>
+            <a:pPr algn="ctr"/>
+            <a:r>
+              <a:rPr lang="bg-BG" sz="2800" b="1" dirty="0" smtClean="0">
+                <a:solidFill>
+                  <a:srgbClr val="FFFFFF"/>
+                </a:solidFill>
+                <a:effectLst>
+                  <a:outerShdw blurRad="38100" dist="38100" dir="2700000" algn="tl">
+                    <a:srgbClr val="000000">
+                      <a:alpha val="43137"/>
+                    </a:srgbClr>
+                  </a:outerShdw>
+                </a:effectLst>
+              </a:rPr>
+              <a:t>Спиране на изпълнението на кода</a:t>
+            </a:r>
+            <a:endParaRPr lang="en-US" sz="2800" b="1" dirty="0">
+              <a:solidFill>
+                <a:srgbClr val="FFFFFF"/>
+              </a:solidFill>
+              <a:effectLst>
+                <a:outerShdw blurRad="38100" dist="38100" dir="2700000" algn="tl">
+                  <a:srgbClr val="000000">
+                    <a:alpha val="43137"/>
+                  </a:srgbClr>
+                </a:outerShdw>
+              </a:effectLst>
+            </a:endParaRPr>
+          </a:p>
+        </p:txBody>
+      </p:sp>
+      <p:sp>
+        <p:nvSpPr>
+          <p:cNvPr id="18" name="Rounded Rectangular Callout 17"/>
+          <p:cNvSpPr/>
+          <p:nvPr/>
+        </p:nvSpPr>
+        <p:spPr bwMode="auto">
+          <a:xfrm>
+            <a:off x="2181000" y="4340079"/>
+            <a:ext cx="2097600" cy="945000"/>
+          </a:xfrm>
+          <a:prstGeom prst="wedgeRoundRectCallout">
+            <a:avLst>
+              <a:gd name="adj1" fmla="val 65909"/>
+              <a:gd name="adj2" fmla="val -97762"/>
+              <a:gd name="adj3" fmla="val 16667"/>
+            </a:avLst>
+          </a:prstGeom>
+          <a:solidFill>
+            <a:schemeClr val="dk2">
+              <a:alpha val="80000"/>
+            </a:schemeClr>
+          </a:solidFill>
+          <a:ln w="19050">
+            <a:solidFill>
+              <a:schemeClr val="tx1">
+                <a:lumMod val="75000"/>
+                <a:alpha val="80000"/>
+              </a:schemeClr>
+            </a:solidFill>
+          </a:ln>
+          <a:effectLst/>
+        </p:spPr>
+        <p:style>
+          <a:lnRef idx="2">
+            <a:schemeClr val="accent1">
+              <a:shade val="50000"/>
+            </a:schemeClr>
+          </a:lnRef>
+          <a:fillRef idx="1001">
+            <a:schemeClr val="dk2"/>
+          </a:fillRef>
+          <a:effectRef idx="0">
+            <a:schemeClr val="accent1"/>
+          </a:effectRef>
+          <a:fontRef idx="minor">
+            <a:schemeClr val="lt1"/>
+          </a:fontRef>
+        </p:style>
+        <p:txBody>
+          <a:bodyPr rot="0" spcFirstLastPara="0" vertOverflow="overflow" horzOverflow="overflow" vert="horz" wrap="square" lIns="91440" tIns="45720" rIns="91440" bIns="45720" numCol="1" spcCol="0" rtlCol="0" fromWordArt="0" anchor="ctr" anchorCtr="0" forceAA="0" compatLnSpc="1">
+            <a:prstTxWarp prst="textNoShape">
+              <a:avLst/>
+            </a:prstTxWarp>
+            <a:noAutofit/>
+          </a:bodyPr>
+          <a:lstStyle/>
+          <a:p>
+            <a:pPr algn="ctr"/>
+            <a:r>
+              <a:rPr lang="bg-BG" sz="2800" b="1" dirty="0" smtClean="0">
+                <a:solidFill>
+                  <a:srgbClr val="FFFFFF"/>
+                </a:solidFill>
+                <a:effectLst>
+                  <a:outerShdw blurRad="38100" dist="38100" dir="2700000" algn="tl">
+                    <a:srgbClr val="000000">
+                      <a:alpha val="43137"/>
+                    </a:srgbClr>
+                  </a:outerShdw>
+                </a:effectLst>
+              </a:rPr>
+              <a:t>Запазване на кода</a:t>
+            </a:r>
+            <a:endParaRPr lang="en-US" sz="2800" b="1" dirty="0">
+              <a:solidFill>
+                <a:srgbClr val="FFFFFF"/>
+              </a:solidFill>
+              <a:effectLst>
+                <a:outerShdw blurRad="38100" dist="38100" dir="2700000" algn="tl">
+                  <a:srgbClr val="000000">
+                    <a:alpha val="43137"/>
+                  </a:srgbClr>
+                </a:outerShdw>
+              </a:effectLst>
+            </a:endParaRPr>
+          </a:p>
+        </p:txBody>
+      </p:sp>
+    </p:spTree>
+    <p:extLst>
+      <p:ext uri="{BB962C8B-B14F-4D97-AF65-F5344CB8AC3E}">
+        <p14:creationId xmlns:p14="http://schemas.microsoft.com/office/powerpoint/2010/main" val="2895210790"/>
+      </p:ext>
+    </p:extLst>
+  </p:cSld>
+  <p:clrMapOvr>
+    <a:masterClrMapping/>
+  </p:clrMapOvr>
+  <mc:AlternateContent xmlns:mc="http://schemas.openxmlformats.org/markup-compatibility/2006" xmlns:p14="http://schemas.microsoft.com/office/powerpoint/2010/main">
+    <mc:Choice Requires="p14">
+      <p:transition spd="slow" p14:dur="2000" advClick="0" advTm="5000"/>
+    </mc:Choice>
+    <mc:Fallback xmlns="">
+      <p:transition spd="slow" advClick="0" advTm="5000"/>
+    </mc:Fallback>
+  </mc:AlternateContent>
+  <p:timing>
+    <p:tnLst>
+      <p:par>
+        <p:cTn id="1" dur="indefinite" restart="never" nodeType="tmRoot">
+          <p:childTnLst>
+            <p:seq concurrent="1" nextAc="seek">
+              <p:cTn id="2" dur="indefinite" nodeType="mainSeq">
+                <p:childTnLst>
+                  <p:par>
+                    <p:cTn id="3" fill="hold">
+                      <p:stCondLst>
+                        <p:cond delay="indefinite"/>
+                      </p:stCondLst>
+                      <p:childTnLst>
+                        <p:par>
+                          <p:cTn id="4" fill="hold">
+                            <p:stCondLst>
+                              <p:cond delay="0"/>
+                            </p:stCondLst>
+                            <p:childTnLst>
+                              <p:par>
+                                <p:cTn id="5" presetID="1" presetClass="entr" presetSubtype="0" fill="hold" grpId="0" nodeType="clickEffect">
+                                  <p:stCondLst>
+                                    <p:cond delay="0"/>
+                                  </p:stCondLst>
+                                  <p:childTnLst>
+                                    <p:set>
+                                      <p:cBhvr>
+                                        <p:cTn id="6" dur="1" fill="hold">
+                                          <p:stCondLst>
+                                            <p:cond delay="0"/>
+                                          </p:stCondLst>
+                                        </p:cTn>
+                                        <p:tgtEl>
+                                          <p:spTgt spid="5"/>
+                                        </p:tgtEl>
+                                        <p:attrNameLst>
+                                          <p:attrName>style.visibility</p:attrName>
+                                        </p:attrNameLst>
+                                      </p:cBhvr>
+                                      <p:to>
+                                        <p:strVal val="visible"/>
+                                      </p:to>
+                                    </p:set>
+                                  </p:childTnLst>
+                                </p:cTn>
+                              </p:par>
+                            </p:childTnLst>
+                          </p:cTn>
+                        </p:par>
+                      </p:childTnLst>
+                    </p:cTn>
+                  </p:par>
+                  <p:par>
+                    <p:cTn id="7" fill="hold">
+                      <p:stCondLst>
+                        <p:cond delay="indefinite"/>
+                      </p:stCondLst>
+                      <p:childTnLst>
+                        <p:par>
+                          <p:cTn id="8" fill="hold">
+                            <p:stCondLst>
+                              <p:cond delay="0"/>
+                            </p:stCondLst>
+                            <p:childTnLst>
+                              <p:par>
+                                <p:cTn id="9" presetID="1" presetClass="entr" presetSubtype="0" fill="hold" grpId="0" nodeType="clickEffect">
+                                  <p:stCondLst>
+                                    <p:cond delay="0"/>
+                                  </p:stCondLst>
+                                  <p:childTnLst>
+                                    <p:set>
+                                      <p:cBhvr>
+                                        <p:cTn id="10" dur="1" fill="hold">
+                                          <p:stCondLst>
+                                            <p:cond delay="0"/>
+                                          </p:stCondLst>
+                                        </p:cTn>
+                                        <p:tgtEl>
+                                          <p:spTgt spid="11"/>
+                                        </p:tgtEl>
+                                        <p:attrNameLst>
+                                          <p:attrName>style.visibility</p:attrName>
+                                        </p:attrNameLst>
+                                      </p:cBhvr>
+                                      <p:to>
+                                        <p:strVal val="visible"/>
+                                      </p:to>
+                                    </p:set>
+                                  </p:childTnLst>
+                                </p:cTn>
+                              </p:par>
+                            </p:childTnLst>
+                          </p:cTn>
+                        </p:par>
+                      </p:childTnLst>
+                    </p:cTn>
+                  </p:par>
+                  <p:par>
+                    <p:cTn id="11" fill="hold">
+                      <p:stCondLst>
+                        <p:cond delay="indefinite"/>
+                      </p:stCondLst>
+                      <p:childTnLst>
+                        <p:par>
+                          <p:cTn id="12" fill="hold">
+                            <p:stCondLst>
+                              <p:cond delay="0"/>
+                            </p:stCondLst>
+                            <p:childTnLst>
+                              <p:par>
+                                <p:cTn id="13" presetID="1" presetClass="entr" presetSubtype="0" fill="hold" grpId="0" nodeType="clickEffect">
+                                  <p:stCondLst>
+                                    <p:cond delay="0"/>
+                                  </p:stCondLst>
+                                  <p:childTnLst>
+                                    <p:set>
+                                      <p:cBhvr>
+                                        <p:cTn id="14" dur="1" fill="hold">
+                                          <p:stCondLst>
+                                            <p:cond delay="0"/>
+                                          </p:stCondLst>
+                                        </p:cTn>
+                                        <p:tgtEl>
+                                          <p:spTgt spid="18"/>
+                                        </p:tgtEl>
+                                        <p:attrNameLst>
+                                          <p:attrName>style.visibility</p:attrName>
+                                        </p:attrNameLst>
+                                      </p:cBhvr>
+                                      <p:to>
+                                        <p:strVal val="visible"/>
+                                      </p:to>
+                                    </p:set>
+                                  </p:childTnLst>
+                                </p:cTn>
+                              </p:par>
+                            </p:childTnLst>
+                          </p:cTn>
+                        </p:par>
+                      </p:childTnLst>
+                    </p:cTn>
+                  </p:par>
+                  <p:par>
+                    <p:cTn id="15" fill="hold">
+                      <p:stCondLst>
+                        <p:cond delay="indefinite"/>
+                      </p:stCondLst>
+                      <p:childTnLst>
+                        <p:par>
+                          <p:cTn id="16" fill="hold">
+                            <p:stCondLst>
+                              <p:cond delay="0"/>
+                            </p:stCondLst>
+                            <p:childTnLst>
+                              <p:par>
+                                <p:cTn id="17" presetID="1" presetClass="entr" presetSubtype="0" fill="hold" grpId="0" nodeType="clickEffect">
+                                  <p:stCondLst>
+                                    <p:cond delay="0"/>
+                                  </p:stCondLst>
+                                  <p:childTnLst>
+                                    <p:set>
+                                      <p:cBhvr>
+                                        <p:cTn id="18" dur="1" fill="hold">
+                                          <p:stCondLst>
+                                            <p:cond delay="0"/>
+                                          </p:stCondLst>
+                                        </p:cTn>
+                                        <p:tgtEl>
+                                          <p:spTgt spid="12"/>
+                                        </p:tgtEl>
+                                        <p:attrNameLst>
+                                          <p:attrName>style.visibility</p:attrName>
+                                        </p:attrNameLst>
+                                      </p:cBhvr>
+                                      <p:to>
+                                        <p:strVal val="visible"/>
+                                      </p:to>
+                                    </p:set>
+                                  </p:childTnLst>
+                                </p:cTn>
+                              </p:par>
+                            </p:childTnLst>
+                          </p:cTn>
+                        </p:par>
+                      </p:childTnLst>
+                    </p:cTn>
+                  </p:par>
+                  <p:par>
+                    <p:cTn id="19" fill="hold">
+                      <p:stCondLst>
+                        <p:cond delay="indefinite"/>
+                      </p:stCondLst>
+                      <p:childTnLst>
+                        <p:par>
+                          <p:cTn id="20" fill="hold">
+                            <p:stCondLst>
+                              <p:cond delay="0"/>
+                            </p:stCondLst>
+                            <p:childTnLst>
+                              <p:par>
+                                <p:cTn id="21" presetID="1" presetClass="entr" presetSubtype="0" fill="hold" grpId="0" nodeType="clickEffect">
+                                  <p:stCondLst>
+                                    <p:cond delay="0"/>
+                                  </p:stCondLst>
+                                  <p:childTnLst>
+                                    <p:set>
+                                      <p:cBhvr>
+                                        <p:cTn id="22" dur="1" fill="hold">
+                                          <p:stCondLst>
+                                            <p:cond delay="0"/>
+                                          </p:stCondLst>
+                                        </p:cTn>
+                                        <p:tgtEl>
+                                          <p:spTgt spid="15"/>
+                                        </p:tgtEl>
+                                        <p:attrNameLst>
+                                          <p:attrName>style.visibility</p:attrName>
+                                        </p:attrNameLst>
+                                      </p:cBhvr>
+                                      <p:to>
+                                        <p:strVal val="visible"/>
+                                      </p:to>
+                                    </p:set>
+                                  </p:childTnLst>
+                                </p:cTn>
+                              </p:par>
+                            </p:childTnLst>
+                          </p:cTn>
+                        </p:par>
+                      </p:childTnLst>
+                    </p:cTn>
+                  </p:par>
+                  <p:par>
+                    <p:cTn id="23" fill="hold">
+                      <p:stCondLst>
+                        <p:cond delay="indefinite"/>
+                      </p:stCondLst>
+                      <p:childTnLst>
+                        <p:par>
+                          <p:cTn id="24" fill="hold">
+                            <p:stCondLst>
+                              <p:cond delay="0"/>
+                            </p:stCondLst>
+                            <p:childTnLst>
+                              <p:par>
+                                <p:cTn id="25" presetID="1" presetClass="entr" presetSubtype="0" fill="hold" grpId="0" nodeType="clickEffect">
+                                  <p:stCondLst>
+                                    <p:cond delay="0"/>
+                                  </p:stCondLst>
+                                  <p:childTnLst>
+                                    <p:set>
+                                      <p:cBhvr>
+                                        <p:cTn id="26" dur="1" fill="hold">
+                                          <p:stCondLst>
+                                            <p:cond delay="0"/>
+                                          </p:stCondLst>
+                                        </p:cTn>
+                                        <p:tgtEl>
+                                          <p:spTgt spid="17"/>
+                                        </p:tgtEl>
+                                        <p:attrNameLst>
+                                          <p:attrName>style.visibility</p:attrName>
+                                        </p:attrNameLst>
+                                      </p:cBhvr>
+                                      <p:to>
+                                        <p:strVal val="visible"/>
+                                      </p:to>
+                                    </p:set>
+                                  </p:childTnLst>
+                                </p:cTn>
+                              </p:par>
+                            </p:childTnLst>
+                          </p:cTn>
+                        </p:par>
+                      </p:childTnLst>
+                    </p:cTn>
+                  </p:par>
+                </p:childTnLst>
+              </p:cTn>
+              <p:prevCondLst>
+                <p:cond evt="onPrev" delay="0">
+                  <p:tgtEl>
+                    <p:sldTgt/>
+                  </p:tgtEl>
+                </p:cond>
+              </p:prevCondLst>
+              <p:nextCondLst>
+                <p:cond evt="onNext" delay="0">
+                  <p:tgtEl>
+                    <p:sldTgt/>
+                  </p:tgtEl>
+                </p:cond>
+              </p:nextCondLst>
+            </p:seq>
+          </p:childTnLst>
+        </p:cTn>
+      </p:par>
+    </p:tnLst>
+    <p:bldLst>
+      <p:bldP spid="5" grpId="0" animBg="1"/>
+      <p:bldP spid="11" grpId="0" animBg="1"/>
+      <p:bldP spid="12" grpId="0" animBg="1"/>
+      <p:bldP spid="15" grpId="0" animBg="1"/>
+      <p:bldP spid="17" grpId="0" animBg="1"/>
+      <p:bldP spid="18" grpId="0" animBg="1"/>
+    </p:bldLst>
+  </p:timing>
+</p:sld>
+</file>
+
+<file path=ppt/slides/slide9.xml><?xml version="1.0" encoding="utf-8"?>
+<p:sld xmlns:a="http://schemas.openxmlformats.org/drawingml/2006/main" xmlns:r="http://schemas.openxmlformats.org/officeDocument/2006/relationships" xmlns:p="http://schemas.openxmlformats.org/presentationml/2006/main">
+  <p:cSld>
+    <p:spTree>
+      <p:nvGrpSpPr>
+        <p:cNvPr id="1" name=""/>
+        <p:cNvGrpSpPr/>
+        <p:nvPr/>
+      </p:nvGrpSpPr>
+      <p:grpSpPr>
+        <a:xfrm>
+          <a:off x="0" y="0"/>
+          <a:ext cx="0" cy="0"/>
+          <a:chOff x="0" y="0"/>
+          <a:chExt cx="0" cy="0"/>
+        </a:xfrm>
+      </p:grpSpPr>
+      <p:pic>
+        <p:nvPicPr>
+          <p:cNvPr id="5" name="Picture 4"/>
+          <p:cNvPicPr>
+            <a:picLocks noChangeAspect="1"/>
+          </p:cNvPicPr>
+          <p:nvPr/>
+        </p:nvPicPr>
+        <p:blipFill rotWithShape="1">
+          <a:blip r:embed="rId2"/>
+          <a:srcRect l="-1" t="1" r="44704" b="52928"/>
+          <a:stretch/>
+        </p:blipFill>
+        <p:spPr>
+          <a:xfrm>
+            <a:off x="1130708" y="4592025"/>
+            <a:ext cx="3634707" cy="1825066"/>
+          </a:xfrm>
+          <a:prstGeom prst="rect">
+            <a:avLst/>
+          </a:prstGeom>
+          <a:ln>
+            <a:solidFill>
+              <a:schemeClr val="bg2">
+                <a:lumMod val="75000"/>
+              </a:schemeClr>
+            </a:solidFill>
+          </a:ln>
+        </p:spPr>
+      </p:pic>
+      <p:sp>
+        <p:nvSpPr>
+          <p:cNvPr id="2" name="Slide Number Placeholder 1"/>
+          <p:cNvSpPr>
+            <a:spLocks noGrp="1"/>
+          </p:cNvSpPr>
+          <p:nvPr>
+            <p:ph type="sldNum" sz="quarter" idx="5"/>
+          </p:nvPr>
+        </p:nvSpPr>
+        <p:spPr/>
+        <p:txBody>
+          <a:bodyPr/>
+          <a:lstStyle/>
+          <a:p>
+            <a:fld id="{2BF067CD-8E6B-4360-9AA8-C5DF2A48A6D1}" type="slidenum">
+              <a:rPr lang="en-US" noProof="0" smtClean="0"/>
+              <a:pPr/>
+              <a:t>9</a:t>
             </a:fld>
             <a:endParaRPr lang="en-US" noProof="0" dirty="0"/>
           </a:p>
@@ -25900,20 +27763,12 @@
               <a:t>След като отворите </a:t>
             </a:r>
             <a:r>
-              <a:rPr lang="bg-BG" b="1" dirty="0" smtClean="0"/>
-              <a:t>онлайн </a:t>
-            </a:r>
-            <a:r>
               <a:rPr lang="en-US" b="1" dirty="0" smtClean="0"/>
               <a:t>IDE</a:t>
             </a:r>
             <a:r>
               <a:rPr lang="bg-BG" dirty="0" smtClean="0"/>
-              <a:t>-то, </a:t>
-            </a:r>
-            <a:r>
-              <a:rPr lang="bg-BG" dirty="0" smtClean="0"/>
-              <a:t>е време да напишем първата ни </a:t>
+              <a:t>-то, е време да напишем първата ни </a:t>
             </a:r>
             <a:r>
               <a:rPr lang="bg-BG" b="1" dirty="0" smtClean="0"/>
@@ -26035,36 +27890,6 @@
           </a:p>
         </p:txBody>
       </p:sp>
-      <p:pic>
-        <p:nvPicPr>
-          <p:cNvPr id="11" name="Picture 10"/>
-          <p:cNvPicPr>
-            <a:picLocks noChangeAspect="1"/>
-          </p:cNvPicPr>
-          <p:nvPr/>
-        </p:nvPicPr>
-        <p:blipFill rotWithShape="1">
-          <a:blip r:embed="rId2"/>
-          <a:srcRect r="60547" b="48622"/>
-          <a:stretch/>
-        </p:blipFill>
-        <p:spPr>
-          <a:xfrm>
-            <a:off x="1005700" y="4403266"/>
-            <a:ext cx="3884724" cy="2103734"/>
-          </a:xfrm>
-          <a:prstGeom prst="rect">
-            <a:avLst/>
-          </a:prstGeom>
-          <a:ln>
-            <a:solidFill>
-              <a:schemeClr val="bg2">
-                <a:lumMod val="75000"/>
-              </a:schemeClr>
-            </a:solidFill>
-          </a:ln>
-        </p:spPr>
-      </p:pic>
       <p:cxnSp>
         <p:nvCxnSpPr>
           <p:cNvPr id="13" name="Straight Arrow Connector 12"/>
@@ -26389,7 +28214,7 @@
                                           </p:stCondLst>
                                         </p:cTn>
                                         <p:tgtEl>
-                                          <p:spTgt spid="11"/>
+                                          <p:spTgt spid="5"/>
                                         </p:tgtEl>
                                         <p:attrNameLst>
                                           <p:attrName>style.visibility</p:attrName>
@@ -26523,479 +28348,6 @@
       <p:bldP spid="6" grpId="0" animBg="1"/>
       <p:bldP spid="8" grpId="0" animBg="1"/>
     </p:bldLst>
-  </p:timing>
-</p:sld>
-</file>
-
-<file path=ppt/slides/slide9.xml><?xml version="1.0" encoding="utf-8"?>
-<p:sld xmlns:a="http://schemas.openxmlformats.org/drawingml/2006/main" xmlns:r="http://schemas.openxmlformats.org/officeDocument/2006/relationships" xmlns:p="http://schemas.openxmlformats.org/presentationml/2006/main">
-  <p:cSld>
-    <p:spTree>
-      <p:nvGrpSpPr>
-        <p:cNvPr id="1" name=""/>
-        <p:cNvGrpSpPr/>
-        <p:nvPr/>
-      </p:nvGrpSpPr>
-      <p:grpSpPr>
-        <a:xfrm>
-          <a:off x="0" y="0"/>
-          <a:ext cx="0" cy="0"/>
-          <a:chOff x="0" y="0"/>
-          <a:chExt cx="0" cy="0"/>
-        </a:xfrm>
-      </p:grpSpPr>
-      <p:sp>
-        <p:nvSpPr>
-          <p:cNvPr id="2" name="Slide Number Placeholder 1"/>
-          <p:cNvSpPr>
-            <a:spLocks noGrp="1"/>
-          </p:cNvSpPr>
-          <p:nvPr>
-            <p:ph type="sldNum" sz="quarter" idx="5"/>
-          </p:nvPr>
-        </p:nvSpPr>
-        <p:spPr/>
-        <p:txBody>
-          <a:bodyPr/>
-          <a:lstStyle/>
-          <a:p>
-            <a:fld id="{2BF067CD-8E6B-4360-9AA8-C5DF2A48A6D1}" type="slidenum">
-              <a:rPr lang="en-US" noProof="0" smtClean="0"/>
-              <a:pPr/>
-              <a:t>9</a:t>
-            </a:fld>
-            <a:endParaRPr lang="en-US" noProof="0" dirty="0"/>
-          </a:p>
-        </p:txBody>
-      </p:sp>
-      <p:sp>
-        <p:nvSpPr>
-          <p:cNvPr id="3" name="Text Placeholder 2"/>
-          <p:cNvSpPr>
-            <a:spLocks noGrp="1"/>
-          </p:cNvSpPr>
-          <p:nvPr>
-            <p:ph type="body" sz="quarter" idx="10"/>
-          </p:nvPr>
-        </p:nvSpPr>
-        <p:spPr/>
-        <p:txBody>
-          <a:bodyPr/>
-          <a:lstStyle/>
-          <a:p>
-            <a:pPr>
-              <a:spcBef>
-                <a:spcPts val="0"/>
-              </a:spcBef>
-              <a:spcAft>
-                <a:spcPts val="0"/>
-              </a:spcAft>
-            </a:pPr>
-            <a:r>
-              <a:rPr lang="bg-BG" sz="3600" dirty="0"/>
-              <a:t>Има два начина за </a:t>
-            </a:r>
-            <a:r>
-              <a:rPr lang="bg-BG" sz="3600" b="1" dirty="0"/>
-              <a:t>стартиране</a:t>
-            </a:r>
-            <a:r>
-              <a:rPr lang="bg-BG" sz="3600" dirty="0"/>
-              <a:t> на </a:t>
-            </a:r>
-            <a:r>
-              <a:rPr lang="bg-BG" sz="3600" b="1" dirty="0"/>
-              <a:t>програмата</a:t>
-            </a:r>
-            <a:r>
-              <a:rPr lang="bg-BG" sz="3600" dirty="0" smtClean="0"/>
-              <a:t>:</a:t>
-            </a:r>
-          </a:p>
-          <a:p>
-            <a:pPr lvl="1">
-              <a:spcBef>
-                <a:spcPts val="0"/>
-              </a:spcBef>
-              <a:spcAft>
-                <a:spcPts val="0"/>
-              </a:spcAft>
-            </a:pPr>
-            <a:r>
-              <a:rPr lang="bg-BG" sz="3400" dirty="0"/>
-              <a:t>Чрез натиснете</a:t>
-            </a:r>
-            <a:r>
-              <a:rPr lang="en-US" sz="3400" dirty="0"/>
-              <a:t> </a:t>
-            </a:r>
-            <a:r>
-              <a:rPr lang="bg-BG" sz="3400" dirty="0"/>
-              <a:t>на </a:t>
-            </a:r>
-            <a:r>
-              <a:rPr lang="bg-BG" sz="3400" b="1" dirty="0"/>
-              <a:t>бутона</a:t>
-            </a:r>
-            <a:r>
-              <a:rPr lang="bg-BG" sz="3400" dirty="0"/>
-              <a:t> [</a:t>
-            </a:r>
-            <a:r>
-              <a:rPr lang="en-US" sz="3400" b="1" dirty="0">
-                <a:solidFill>
-                  <a:schemeClr val="bg1"/>
-                </a:solidFill>
-              </a:rPr>
-              <a:t>Run</a:t>
-            </a:r>
-            <a:r>
-              <a:rPr lang="en-US" sz="3400" dirty="0" smtClean="0"/>
-              <a:t>]</a:t>
-            </a:r>
-            <a:endParaRPr lang="bg-BG" sz="3600" dirty="0"/>
-          </a:p>
-          <a:p>
-            <a:pPr lvl="1">
-              <a:spcBef>
-                <a:spcPts val="0"/>
-              </a:spcBef>
-              <a:spcAft>
-                <a:spcPts val="0"/>
-              </a:spcAft>
-            </a:pPr>
-            <a:r>
-              <a:rPr lang="bg-BG" sz="3400" dirty="0"/>
-              <a:t>Чрез </a:t>
-            </a:r>
-            <a:r>
-              <a:rPr lang="bg-BG" sz="3400" b="1" dirty="0" smtClean="0"/>
-              <a:t>клашива</a:t>
-            </a:r>
-            <a:r>
-              <a:rPr lang="bg-BG" sz="3400" dirty="0" smtClean="0"/>
-              <a:t> </a:t>
-            </a:r>
-            <a:r>
-              <a:rPr lang="en-US" sz="3400" dirty="0" smtClean="0"/>
-              <a:t>[</a:t>
-            </a:r>
-            <a:r>
-              <a:rPr lang="en-US" sz="3400" b="1" dirty="0" smtClean="0">
-                <a:solidFill>
-                  <a:schemeClr val="bg1"/>
-                </a:solidFill>
-              </a:rPr>
-              <a:t>F8</a:t>
-            </a:r>
-            <a:r>
-              <a:rPr lang="en-US" sz="3400" dirty="0" smtClean="0"/>
-              <a:t>]</a:t>
-            </a:r>
-            <a:endParaRPr lang="bg-BG" sz="3400" b="1" dirty="0">
-              <a:solidFill>
-                <a:schemeClr val="bg1"/>
-              </a:solidFill>
-            </a:endParaRPr>
-          </a:p>
-          <a:p>
-            <a:endParaRPr lang="en-US" dirty="0"/>
-          </a:p>
-        </p:txBody>
-      </p:sp>
-      <p:sp>
-        <p:nvSpPr>
-          <p:cNvPr id="4" name="Title 3"/>
-          <p:cNvSpPr>
-            <a:spLocks noGrp="1"/>
-          </p:cNvSpPr>
-          <p:nvPr>
-            <p:ph type="title"/>
-          </p:nvPr>
-        </p:nvSpPr>
-        <p:spPr/>
-        <p:txBody>
-          <a:bodyPr/>
-          <a:lstStyle/>
-          <a:p>
-            <a:r>
-              <a:rPr lang="bg-BG" dirty="0" smtClean="0"/>
-              <a:t>Стартиране на програмата</a:t>
-            </a:r>
-            <a:endParaRPr lang="en-US" dirty="0"/>
-          </a:p>
-        </p:txBody>
-      </p:sp>
-      <p:pic>
-        <p:nvPicPr>
-          <p:cNvPr id="5" name="Picture 4"/>
-          <p:cNvPicPr>
-            <a:picLocks noChangeAspect="1"/>
-          </p:cNvPicPr>
-          <p:nvPr/>
-        </p:nvPicPr>
-        <p:blipFill rotWithShape="1">
-          <a:blip r:embed="rId2"/>
-          <a:srcRect r="50430"/>
-          <a:stretch/>
-        </p:blipFill>
-        <p:spPr>
-          <a:xfrm>
-            <a:off x="2991000" y="4274838"/>
-            <a:ext cx="2249999" cy="1064707"/>
-          </a:xfrm>
-          <a:prstGeom prst="rect">
-            <a:avLst/>
-          </a:prstGeom>
-          <a:ln>
-            <a:solidFill>
-              <a:schemeClr val="bg2">
-                <a:lumMod val="75000"/>
-              </a:schemeClr>
-            </a:solidFill>
-          </a:ln>
-        </p:spPr>
-      </p:pic>
-      <p:pic>
-        <p:nvPicPr>
-          <p:cNvPr id="3074" name="Picture 2" descr="Clipart: Computer Keyboard keys - F8 key"/>
-          <p:cNvPicPr>
-            <a:picLocks noChangeAspect="1" noChangeArrowheads="1"/>
-          </p:cNvPicPr>
-          <p:nvPr/>
-        </p:nvPicPr>
-        <p:blipFill>
-          <a:blip r:embed="rId3">
-            <a:extLst>
-              <a:ext uri="{28A0092B-C50C-407E-A947-70E740481C1C}">
-                <a14:useLocalDpi xmlns:a14="http://schemas.microsoft.com/office/drawing/2010/main" val="0"/>
-              </a:ext>
-            </a:extLst>
-          </a:blip>
-          <a:srcRect/>
-          <a:stretch>
-            <a:fillRect/>
-          </a:stretch>
-        </p:blipFill>
-        <p:spPr bwMode="auto">
-          <a:xfrm>
-            <a:off x="7041000" y="3699000"/>
-            <a:ext cx="2336550" cy="2216385"/>
-          </a:xfrm>
-          <a:prstGeom prst="rect">
-            <a:avLst/>
-          </a:prstGeom>
-          <a:noFill/>
-          <a:extLst>
-            <a:ext uri="{909E8E84-426E-40DD-AFC4-6F175D3DCCD1}">
-              <a14:hiddenFill xmlns:a14="http://schemas.microsoft.com/office/drawing/2010/main">
-                <a:solidFill>
-                  <a:srgbClr val="FFFFFF"/>
-                </a:solidFill>
-              </a14:hiddenFill>
-            </a:ext>
-          </a:extLst>
-        </p:spPr>
-      </p:pic>
-    </p:spTree>
-    <p:extLst>
-      <p:ext uri="{BB962C8B-B14F-4D97-AF65-F5344CB8AC3E}">
-        <p14:creationId xmlns:p14="http://schemas.microsoft.com/office/powerpoint/2010/main" val="805259703"/>
-      </p:ext>
-    </p:extLst>
-  </p:cSld>
-  <p:clrMapOvr>
-    <a:masterClrMapping/>
-  </p:clrMapOvr>
-  <mc:AlternateContent xmlns:mc="http://schemas.openxmlformats.org/markup-compatibility/2006" xmlns:p14="http://schemas.microsoft.com/office/powerpoint/2010/main">
-    <mc:Choice Requires="p14">
-      <p:transition spd="slow" p14:dur="2000" advClick="0" advTm="5000"/>
-    </mc:Choice>
-    <mc:Fallback xmlns="">
-      <p:transition spd="slow" advClick="0" advTm="5000"/>
-    </mc:Fallback>
-  </mc:AlternateContent>
-  <p:timing>
-    <p:tnLst>
-      <p:par>
-        <p:cTn id="1" dur="indefinite" restart="never" nodeType="tmRoot">
-          <p:childTnLst>
-            <p:seq concurrent="1" nextAc="seek">
-              <p:cTn id="2" dur="indefinite" nodeType="mainSeq">
-                <p:childTnLst>
-                  <p:par>
-                    <p:cTn id="3" fill="hold">
-                      <p:stCondLst>
-                        <p:cond delay="indefinite"/>
-                      </p:stCondLst>
-                      <p:childTnLst>
-                        <p:par>
-                          <p:cTn id="4" fill="hold">
-                            <p:stCondLst>
-                              <p:cond delay="0"/>
-                            </p:stCondLst>
-                            <p:childTnLst>
-                              <p:par>
-                                <p:cTn id="5" presetID="1" presetClass="entr" presetSubtype="0" fill="hold" nodeType="clickEffect">
-                                  <p:stCondLst>
-                                    <p:cond delay="0"/>
-                                  </p:stCondLst>
-                                  <p:childTnLst>
-                                    <p:set>
-                                      <p:cBhvr>
-                                        <p:cTn id="6" dur="1" fill="hold">
-                                          <p:stCondLst>
-                                            <p:cond delay="0"/>
-                                          </p:stCondLst>
-                                        </p:cTn>
-                                        <p:tgtEl>
-                                          <p:spTgt spid="3">
-                                            <p:txEl>
-                                              <p:pRg st="1" end="1"/>
-                                            </p:txEl>
-                                          </p:spTgt>
-                                        </p:tgtEl>
-                                        <p:attrNameLst>
-                                          <p:attrName>style.visibility</p:attrName>
-                                        </p:attrNameLst>
-                                      </p:cBhvr>
-                                      <p:to>
-                                        <p:strVal val="visible"/>
-                                      </p:to>
-                                    </p:set>
-                                  </p:childTnLst>
-                                </p:cTn>
-                              </p:par>
-                              <p:par>
-                                <p:cTn id="7" presetID="1" presetClass="entr" presetSubtype="0" fill="hold" nodeType="withEffect">
-                                  <p:stCondLst>
-                                    <p:cond delay="0"/>
-                                  </p:stCondLst>
-                                  <p:childTnLst>
-                                    <p:set>
-                                      <p:cBhvr>
-                                        <p:cTn id="8" dur="1" fill="hold">
-                                          <p:stCondLst>
-                                            <p:cond delay="0"/>
-                                          </p:stCondLst>
-                                        </p:cTn>
-                                        <p:tgtEl>
-                                          <p:spTgt spid="5"/>
-                                        </p:tgtEl>
-                                        <p:attrNameLst>
-                                          <p:attrName>style.visibility</p:attrName>
-                                        </p:attrNameLst>
-                                      </p:cBhvr>
-                                      <p:to>
-                                        <p:strVal val="visible"/>
-                                      </p:to>
-                                    </p:set>
-                                  </p:childTnLst>
-                                </p:cTn>
-                              </p:par>
-                            </p:childTnLst>
-                          </p:cTn>
-                        </p:par>
-                      </p:childTnLst>
-                    </p:cTn>
-                  </p:par>
-                  <p:par>
-                    <p:cTn id="9" fill="hold">
-                      <p:stCondLst>
-                        <p:cond delay="indefinite"/>
-                      </p:stCondLst>
-                      <p:childTnLst>
-                        <p:par>
-                          <p:cTn id="10" fill="hold">
-                            <p:stCondLst>
-                              <p:cond delay="0"/>
-                            </p:stCondLst>
-                            <p:childTnLst>
-                              <p:par>
-                                <p:cTn id="11" presetID="1" presetClass="entr" presetSubtype="0" fill="hold" nodeType="clickEffect">
-                                  <p:stCondLst>
-                                    <p:cond delay="0"/>
-                                  </p:stCondLst>
-                                  <p:childTnLst>
-                                    <p:set>
-                                      <p:cBhvr>
-                                        <p:cTn id="12" dur="1" fill="hold">
-                                          <p:stCondLst>
-                                            <p:cond delay="0"/>
-                                          </p:stCondLst>
-                                        </p:cTn>
-                                        <p:tgtEl>
-                                          <p:spTgt spid="3">
-                                            <p:txEl>
-                                              <p:pRg st="2" end="2"/>
-                                            </p:txEl>
-                                          </p:spTgt>
-                                        </p:tgtEl>
-                                        <p:attrNameLst>
-                                          <p:attrName>style.visibility</p:attrName>
-                                        </p:attrNameLst>
-                                      </p:cBhvr>
-                                      <p:to>
-                                        <p:strVal val="visible"/>
-                                      </p:to>
-                                    </p:set>
-                                  </p:childTnLst>
-                                </p:cTn>
-                              </p:par>
-                              <p:par>
-                                <p:cTn id="13" presetID="1" presetClass="entr" presetSubtype="0" fill="hold" nodeType="withEffect">
-                                  <p:stCondLst>
-                                    <p:cond delay="0"/>
-                                  </p:stCondLst>
-                                  <p:childTnLst>
-                                    <p:set>
-                                      <p:cBhvr>
-                                        <p:cTn id="14" dur="1" fill="hold">
-                                          <p:stCondLst>
-                                            <p:cond delay="0"/>
-                                          </p:stCondLst>
-                                        </p:cTn>
-                                        <p:tgtEl>
-                                          <p:spTgt spid="3074"/>
-                                        </p:tgtEl>
-                                        <p:attrNameLst>
-                                          <p:attrName>style.visibility</p:attrName>
-                                        </p:attrNameLst>
-                                      </p:cBhvr>
-                                      <p:to>
-                                        <p:strVal val="visible"/>
-                                      </p:to>
-                                    </p:set>
-                                  </p:childTnLst>
-                                </p:cTn>
-                              </p:par>
-                            </p:childTnLst>
-                          </p:cTn>
-                        </p:par>
-                      </p:childTnLst>
-                    </p:cTn>
-                  </p:par>
-                </p:childTnLst>
-              </p:cTn>
-              <p:prevCondLst>
-                <p:cond evt="onPrev" delay="0">
-                  <p:tgtEl>
-                    <p:sldTgt/>
-                  </p:tgtEl>
-                </p:cond>
-              </p:prevCondLst>
-              <p:nextCondLst>
-                <p:cond evt="onNext" delay="0">
-                  <p:tgtEl>
-                    <p:sldTgt/>
-                  </p:tgtEl>
-                </p:cond>
-              </p:nextCondLst>
-            </p:seq>
-          </p:childTnLst>
-        </p:cTn>
-      </p:par>
-    </p:tnLst>
   </p:timing>
 </p:sld>
 </file>

</xml_diff>